<commit_message>
Added links to podcasts to that-is-all-folks.pptx
</commit_message>
<xml_diff>
--- a/Presentation/that-is-all-folks.pptx
+++ b/Presentation/that-is-all-folks.pptx
@@ -5,12 +5,13 @@
     <p:sldMasterId id="2147483648" r:id="rId1"/>
   </p:sldMasterIdLst>
   <p:notesMasterIdLst>
-    <p:notesMasterId r:id="rId5"/>
+    <p:notesMasterId r:id="rId6"/>
   </p:notesMasterIdLst>
   <p:sldIdLst>
     <p:sldId id="257" r:id="rId2"/>
     <p:sldId id="261" r:id="rId3"/>
-    <p:sldId id="262" r:id="rId4"/>
+    <p:sldId id="263" r:id="rId4"/>
+    <p:sldId id="262" r:id="rId5"/>
   </p:sldIdLst>
   <p:sldSz cx="9144000" cy="6858000" type="screen4x3"/>
   <p:notesSz cx="6858000" cy="9144000"/>
@@ -194,7 +195,7 @@
           <a:p>
             <a:fld id="{B24A7054-7FFB-49F4-A126-5DF6E687FF53}" type="datetimeFigureOut">
               <a:rPr lang="ru-RU" smtClean="0"/>
-              <a:t>14.02.2013</a:t>
+              <a:t>27.03.2013</a:t>
             </a:fld>
             <a:endParaRPr lang="ru-RU"/>
           </a:p>
@@ -1476,7 +1477,7 @@
           <a:p>
             <a:fld id="{8E6E6A2A-E9D3-4A0D-B04A-ABDD367A1E08}" type="datetimeFigureOut">
               <a:rPr lang="ru-RU" smtClean="0"/>
-              <a:t>14.02.2013</a:t>
+              <a:t>27.03.2013</a:t>
             </a:fld>
             <a:endParaRPr lang="ru-RU"/>
           </a:p>
@@ -2921,7 +2922,7 @@
           <a:p>
             <a:fld id="{AC3D3127-B7C4-45E3-9797-C527EC9FDD78}" type="datetimeFigureOut">
               <a:rPr lang="ru-RU" smtClean="0"/>
-              <a:t>14.02.2013</a:t>
+              <a:t>27.03.2013</a:t>
             </a:fld>
             <a:endParaRPr lang="ru-RU"/>
           </a:p>
@@ -3520,7 +3521,15 @@
                   <a:schemeClr val="bg1"/>
                 </a:solidFill>
               </a:rPr>
-              <a:t>Что выбрать </a:t>
+              <a:t>Другие </a:t>
+            </a:r>
+            <a:r>
+              <a:rPr lang="ru-RU" sz="4400" dirty="0">
+                <a:solidFill>
+                  <a:schemeClr val="bg1"/>
+                </a:solidFill>
+              </a:rPr>
+              <a:t>курсы </a:t>
             </a:r>
             <a:r>
               <a:rPr lang="ru-RU" sz="4400" dirty="0" smtClean="0">
@@ -3528,7 +3537,7 @@
                   <a:schemeClr val="bg1"/>
                 </a:solidFill>
               </a:rPr>
-              <a:t>дальше (</a:t>
+              <a:t>БелХард по </a:t>
             </a:r>
             <a:r>
               <a:rPr lang="en-US" sz="4400" dirty="0" smtClean="0">
@@ -3536,15 +3545,7 @@
                   <a:schemeClr val="bg1"/>
                 </a:solidFill>
               </a:rPr>
-              <a:t>.NET)</a:t>
-            </a:r>
-            <a:r>
-              <a:rPr lang="ru-RU" sz="4400" dirty="0" smtClean="0">
-                <a:solidFill>
-                  <a:schemeClr val="bg1"/>
-                </a:solidFill>
-              </a:rPr>
-              <a:t>?</a:t>
+              <a:t>.NET</a:t>
             </a:r>
             <a:endParaRPr lang="en-US" sz="4400" dirty="0">
               <a:solidFill>
@@ -3562,8 +3563,8 @@
         </p:nvSpPr>
         <p:spPr>
           <a:xfrm>
-            <a:off x="251520" y="1052736"/>
-            <a:ext cx="8640960" cy="2062103"/>
+            <a:off x="251520" y="1450519"/>
+            <a:ext cx="8640960" cy="2554545"/>
           </a:xfrm>
           <a:prstGeom prst="rect">
             <a:avLst/>
@@ -3611,7 +3612,19 @@
             </a:pPr>
             <a:r>
               <a:rPr lang="ru-RU" sz="3200" dirty="0" smtClean="0"/>
-              <a:t>Сначала – «HTML </a:t>
+              <a:t>Перед этим </a:t>
+            </a:r>
+            <a:r>
+              <a:rPr lang="ru-RU" sz="3200" dirty="0" smtClean="0"/>
+              <a:t>рекомендуется </a:t>
+            </a:r>
+            <a:r>
+              <a:rPr lang="ru-RU" sz="3200" dirty="0" smtClean="0"/>
+              <a:t>– </a:t>
+            </a:r>
+            <a:r>
+              <a:rPr lang="ru-RU" sz="3200" dirty="0" smtClean="0"/>
+              <a:t>«HTML </a:t>
             </a:r>
             <a:r>
               <a:rPr lang="ru-RU" sz="3200" dirty="0"/>
@@ -3646,6 +3659,138 @@
 </file>
 
 <file path=ppt/slides/slide3.xml><?xml version="1.0" encoding="utf-8"?>
+<p:sld xmlns:a="http://schemas.openxmlformats.org/drawingml/2006/main" xmlns:r="http://schemas.openxmlformats.org/officeDocument/2006/relationships" xmlns:p="http://schemas.openxmlformats.org/presentationml/2006/main">
+  <p:cSld>
+    <p:spTree>
+      <p:nvGrpSpPr>
+        <p:cNvPr id="1" name=""/>
+        <p:cNvGrpSpPr/>
+        <p:nvPr/>
+      </p:nvGrpSpPr>
+      <p:grpSpPr>
+        <a:xfrm>
+          <a:off x="0" y="0"/>
+          <a:ext cx="0" cy="0"/>
+          <a:chOff x="0" y="0"/>
+          <a:chExt cx="0" cy="0"/>
+        </a:xfrm>
+      </p:grpSpPr>
+      <p:sp>
+        <p:nvSpPr>
+          <p:cNvPr id="2" name="Title 1"/>
+          <p:cNvSpPr>
+            <a:spLocks noGrp="1"/>
+          </p:cNvSpPr>
+          <p:nvPr>
+            <p:ph type="title"/>
+          </p:nvPr>
+        </p:nvSpPr>
+        <p:spPr/>
+        <p:txBody>
+          <a:bodyPr/>
+          <a:lstStyle/>
+          <a:p>
+            <a:r>
+              <a:rPr lang="ru-RU" dirty="0" smtClean="0"/>
+              <a:t>Подкасты</a:t>
+            </a:r>
+            <a:endParaRPr lang="en-US" dirty="0"/>
+          </a:p>
+        </p:txBody>
+      </p:sp>
+      <p:sp>
+        <p:nvSpPr>
+          <p:cNvPr id="3" name="Content Placeholder 2"/>
+          <p:cNvSpPr>
+            <a:spLocks noGrp="1"/>
+          </p:cNvSpPr>
+          <p:nvPr>
+            <p:ph idx="1"/>
+          </p:nvPr>
+        </p:nvSpPr>
+        <p:spPr/>
+        <p:txBody>
+          <a:bodyPr/>
+          <a:lstStyle/>
+          <a:p>
+            <a:r>
+              <a:rPr lang="en-US" dirty="0" err="1" smtClean="0"/>
+              <a:t>Hanselminutes</a:t>
+            </a:r>
+            <a:r>
+              <a:rPr lang="en-US" dirty="0" smtClean="0"/>
+              <a:t> (English)</a:t>
+            </a:r>
+            <a:r>
+              <a:rPr lang="en-US" dirty="0"/>
+              <a:t/>
+            </a:r>
+            <a:br>
+              <a:rPr lang="en-US" dirty="0"/>
+            </a:br>
+            <a:r>
+              <a:rPr lang="en-US" dirty="0">
+                <a:hlinkClick r:id="rId2"/>
+              </a:rPr>
+              <a:t>http://www.hanselminutes.com</a:t>
+            </a:r>
+            <a:r>
+              <a:rPr lang="en-US" dirty="0" smtClean="0">
+                <a:hlinkClick r:id="rId2"/>
+              </a:rPr>
+              <a:t>/</a:t>
+            </a:r>
+            <a:endParaRPr lang="en-US" dirty="0" smtClean="0"/>
+          </a:p>
+          <a:p>
+            <a:r>
+              <a:rPr lang="en-US" dirty="0"/>
+              <a:t>.NET Rocks</a:t>
+            </a:r>
+            <a:r>
+              <a:rPr lang="en-US" dirty="0" smtClean="0"/>
+              <a:t>! </a:t>
+            </a:r>
+            <a:r>
+              <a:rPr lang="en-US" dirty="0"/>
+              <a:t>(English)</a:t>
+            </a:r>
+            <a:br>
+              <a:rPr lang="en-US" dirty="0"/>
+            </a:br>
+            <a:r>
+              <a:rPr lang="en-US" dirty="0">
+                <a:hlinkClick r:id="rId3"/>
+              </a:rPr>
+              <a:t>http://www.dotnetrocks.com</a:t>
+            </a:r>
+            <a:r>
+              <a:rPr lang="en-US" dirty="0" smtClean="0">
+                <a:hlinkClick r:id="rId3"/>
+              </a:rPr>
+              <a:t>/</a:t>
+            </a:r>
+            <a:endParaRPr lang="en-US" dirty="0" smtClean="0"/>
+          </a:p>
+          <a:p>
+            <a:endParaRPr lang="en-US" dirty="0"/>
+          </a:p>
+        </p:txBody>
+      </p:sp>
+    </p:spTree>
+    <p:extLst>
+      <p:ext uri="{BB962C8B-B14F-4D97-AF65-F5344CB8AC3E}">
+        <p14:creationId xmlns:p14="http://schemas.microsoft.com/office/powerpoint/2010/main" val="2793566807"/>
+      </p:ext>
+    </p:extLst>
+  </p:cSld>
+  <p:clrMapOvr>
+    <a:masterClrMapping/>
+  </p:clrMapOvr>
+</p:sld>
+</file>
+
+<file path=ppt/slides/slide4.xml><?xml version="1.0" encoding="utf-8"?>
 <p:sld xmlns:a="http://schemas.openxmlformats.org/drawingml/2006/main" xmlns:r="http://schemas.openxmlformats.org/officeDocument/2006/relationships" xmlns:p="http://schemas.openxmlformats.org/presentationml/2006/main">
   <p:cSld>
     <p:bg>

</xml_diff>

<commit_message>
Translated more questions from self check Q's
</commit_message>
<xml_diff>
--- a/Presentation/that-is-all-folks.pptx
+++ b/Presentation/that-is-all-folks.pptx
@@ -5,18 +5,19 @@
     <p:sldMasterId id="2147483648" r:id="rId1"/>
   </p:sldMasterIdLst>
   <p:notesMasterIdLst>
-    <p:notesMasterId r:id="rId11"/>
+    <p:notesMasterId r:id="rId12"/>
   </p:notesMasterIdLst>
   <p:sldIdLst>
     <p:sldId id="257" r:id="rId2"/>
     <p:sldId id="261" r:id="rId3"/>
     <p:sldId id="265" r:id="rId4"/>
     <p:sldId id="264" r:id="rId5"/>
-    <p:sldId id="266" r:id="rId6"/>
-    <p:sldId id="267" r:id="rId7"/>
-    <p:sldId id="268" r:id="rId8"/>
-    <p:sldId id="269" r:id="rId9"/>
-    <p:sldId id="262" r:id="rId10"/>
+    <p:sldId id="270" r:id="rId6"/>
+    <p:sldId id="266" r:id="rId7"/>
+    <p:sldId id="267" r:id="rId8"/>
+    <p:sldId id="268" r:id="rId9"/>
+    <p:sldId id="269" r:id="rId10"/>
+    <p:sldId id="262" r:id="rId11"/>
   </p:sldIdLst>
   <p:sldSz cx="9144000" cy="6858000" type="screen4x3"/>
   <p:notesSz cx="6858000" cy="9144000"/>
@@ -200,7 +201,7 @@
           <a:p>
             <a:fld id="{B24A7054-7FFB-49F4-A126-5DF6E687FF53}" type="datetimeFigureOut">
               <a:rPr lang="ru-RU" smtClean="0"/>
-              <a:t>30.04.2013</a:t>
+              <a:t>22.10.2013</a:t>
             </a:fld>
             <a:endParaRPr lang="ru-RU"/>
           </a:p>
@@ -1482,7 +1483,7 @@
           <a:p>
             <a:fld id="{8E6E6A2A-E9D3-4A0D-B04A-ABDD367A1E08}" type="datetimeFigureOut">
               <a:rPr lang="ru-RU" smtClean="0"/>
-              <a:t>30.04.2013</a:t>
+              <a:t>22.10.2013</a:t>
             </a:fld>
             <a:endParaRPr lang="ru-RU"/>
           </a:p>
@@ -2927,7 +2928,7 @@
           <a:p>
             <a:fld id="{AC3D3127-B7C4-45E3-9797-C527EC9FDD78}" type="datetimeFigureOut">
               <a:rPr lang="ru-RU" smtClean="0"/>
-              <a:t>30.04.2013</a:t>
+              <a:t>22.10.2013</a:t>
             </a:fld>
             <a:endParaRPr lang="ru-RU"/>
           </a:p>
@@ -3481,1344 +3482,7 @@
 </p:sld>
 </file>
 
-<file path=ppt/slides/slide2.xml><?xml version="1.0" encoding="utf-8"?>
-<p:sld xmlns:a="http://schemas.openxmlformats.org/drawingml/2006/main" xmlns:r="http://schemas.openxmlformats.org/officeDocument/2006/relationships" xmlns:p="http://schemas.openxmlformats.org/presentationml/2006/main">
-  <p:cSld>
-    <p:spTree>
-      <p:nvGrpSpPr>
-        <p:cNvPr id="1" name=""/>
-        <p:cNvGrpSpPr/>
-        <p:nvPr/>
-      </p:nvGrpSpPr>
-      <p:grpSpPr>
-        <a:xfrm>
-          <a:off x="0" y="0"/>
-          <a:ext cx="0" cy="0"/>
-          <a:chOff x="0" y="0"/>
-          <a:chExt cx="0" cy="0"/>
-        </a:xfrm>
-      </p:grpSpPr>
-      <p:sp>
-        <p:nvSpPr>
-          <p:cNvPr id="3" name="Rectangle 2"/>
-          <p:cNvSpPr/>
-          <p:nvPr/>
-        </p:nvSpPr>
-        <p:spPr>
-          <a:xfrm>
-            <a:off x="251520" y="188640"/>
-            <a:ext cx="8640960" cy="769441"/>
-          </a:xfrm>
-          <a:prstGeom prst="rect">
-            <a:avLst/>
-          </a:prstGeom>
-        </p:spPr>
-        <p:txBody>
-          <a:bodyPr wrap="square">
-            <a:spAutoFit/>
-          </a:bodyPr>
-          <a:lstStyle/>
-          <a:p>
-            <a:pPr lvl="0" algn="ctr"/>
-            <a:r>
-              <a:rPr lang="ru-RU" sz="4400" dirty="0" smtClean="0">
-                <a:solidFill>
-                  <a:schemeClr val="bg1"/>
-                </a:solidFill>
-              </a:rPr>
-              <a:t>Другие </a:t>
-            </a:r>
-            <a:r>
-              <a:rPr lang="ru-RU" sz="4400" dirty="0">
-                <a:solidFill>
-                  <a:schemeClr val="bg1"/>
-                </a:solidFill>
-              </a:rPr>
-              <a:t>курсы </a:t>
-            </a:r>
-            <a:r>
-              <a:rPr lang="ru-RU" sz="4400" dirty="0" smtClean="0">
-                <a:solidFill>
-                  <a:schemeClr val="bg1"/>
-                </a:solidFill>
-              </a:rPr>
-              <a:t>БелХард по </a:t>
-            </a:r>
-            <a:r>
-              <a:rPr lang="en-US" sz="4400" dirty="0" smtClean="0">
-                <a:solidFill>
-                  <a:schemeClr val="bg1"/>
-                </a:solidFill>
-              </a:rPr>
-              <a:t>.NET</a:t>
-            </a:r>
-            <a:endParaRPr lang="en-US" sz="4400" dirty="0">
-              <a:solidFill>
-                <a:schemeClr val="bg1"/>
-              </a:solidFill>
-            </a:endParaRPr>
-          </a:p>
-        </p:txBody>
-      </p:sp>
-      <p:sp>
-        <p:nvSpPr>
-          <p:cNvPr id="2" name="TextBox 1"/>
-          <p:cNvSpPr txBox="1"/>
-          <p:nvPr/>
-        </p:nvSpPr>
-        <p:spPr>
-          <a:xfrm>
-            <a:off x="251520" y="1450519"/>
-            <a:ext cx="8640960" cy="2554545"/>
-          </a:xfrm>
-          <a:prstGeom prst="rect">
-            <a:avLst/>
-          </a:prstGeom>
-          <a:noFill/>
-        </p:spPr>
-        <p:txBody>
-          <a:bodyPr wrap="square" rtlCol="0">
-            <a:spAutoFit/>
-          </a:bodyPr>
-          <a:lstStyle/>
-          <a:p>
-            <a:pPr marL="457200" indent="-457200">
-              <a:buFont typeface="Arial" pitchFamily="34" charset="0"/>
-              <a:buChar char="•"/>
-            </a:pPr>
-            <a:r>
-              <a:rPr lang="ru-RU" sz="3200" dirty="0" smtClean="0"/>
-              <a:t>Создание </a:t>
-            </a:r>
-            <a:r>
-              <a:rPr lang="ru-RU" sz="3200" dirty="0"/>
-              <a:t>веб-приложений в </a:t>
-            </a:r>
-            <a:r>
-              <a:rPr lang="en-US" sz="3200" dirty="0" smtClean="0"/>
-              <a:t>ASP.NET</a:t>
-            </a:r>
-          </a:p>
-          <a:p>
-            <a:pPr marL="914400" lvl="1" indent="-457200">
-              <a:buFont typeface="Arial" pitchFamily="34" charset="0"/>
-              <a:buChar char="•"/>
-            </a:pPr>
-            <a:r>
-              <a:rPr lang="ru-RU" sz="3200" dirty="0" smtClean="0"/>
-              <a:t>Перед этим рекомендуется – «HTML </a:t>
-            </a:r>
-            <a:r>
-              <a:rPr lang="ru-RU" sz="3200" dirty="0"/>
-              <a:t>и CSS. Секреты вёрстки</a:t>
-            </a:r>
-            <a:r>
-              <a:rPr lang="ru-RU" sz="3200" dirty="0" smtClean="0"/>
-              <a:t>.»</a:t>
-            </a:r>
-            <a:endParaRPr lang="ru-RU" sz="3200" dirty="0"/>
-          </a:p>
-          <a:p>
-            <a:pPr marL="457200" indent="-457200">
-              <a:buFont typeface="Arial" pitchFamily="34" charset="0"/>
-              <a:buChar char="•"/>
-            </a:pPr>
-            <a:r>
-              <a:rPr lang="ru-RU" sz="3200" dirty="0"/>
-              <a:t>Windows Phone 7: проектирование и разработка приложений</a:t>
-            </a:r>
-          </a:p>
-        </p:txBody>
-      </p:sp>
-    </p:spTree>
-    <p:extLst>
-      <p:ext uri="{BB962C8B-B14F-4D97-AF65-F5344CB8AC3E}">
-        <p14:creationId xmlns:p14="http://schemas.microsoft.com/office/powerpoint/2010/main" val="1086215874"/>
-      </p:ext>
-    </p:extLst>
-  </p:cSld>
-  <p:clrMapOvr>
-    <a:masterClrMapping/>
-  </p:clrMapOvr>
-  <p:timing>
-    <p:tnLst>
-      <p:par>
-        <p:cTn id="1" dur="indefinite" restart="never" nodeType="tmRoot"/>
-      </p:par>
-    </p:tnLst>
-  </p:timing>
-</p:sld>
-</file>
-
-<file path=ppt/slides/slide3.xml><?xml version="1.0" encoding="utf-8"?>
-<p:sld xmlns:a="http://schemas.openxmlformats.org/drawingml/2006/main" xmlns:r="http://schemas.openxmlformats.org/officeDocument/2006/relationships" xmlns:p="http://schemas.openxmlformats.org/presentationml/2006/main">
-  <p:cSld>
-    <p:spTree>
-      <p:nvGrpSpPr>
-        <p:cNvPr id="1" name=""/>
-        <p:cNvGrpSpPr/>
-        <p:nvPr/>
-      </p:nvGrpSpPr>
-      <p:grpSpPr>
-        <a:xfrm>
-          <a:off x="0" y="0"/>
-          <a:ext cx="0" cy="0"/>
-          <a:chOff x="0" y="0"/>
-          <a:chExt cx="0" cy="0"/>
-        </a:xfrm>
-      </p:grpSpPr>
-      <p:sp>
-        <p:nvSpPr>
-          <p:cNvPr id="3" name="Rectangle 2"/>
-          <p:cNvSpPr/>
-          <p:nvPr/>
-        </p:nvSpPr>
-        <p:spPr>
-          <a:xfrm>
-            <a:off x="251520" y="188640"/>
-            <a:ext cx="8640960" cy="769441"/>
-          </a:xfrm>
-          <a:prstGeom prst="rect">
-            <a:avLst/>
-          </a:prstGeom>
-        </p:spPr>
-        <p:txBody>
-          <a:bodyPr wrap="square">
-            <a:spAutoFit/>
-          </a:bodyPr>
-          <a:lstStyle/>
-          <a:p>
-            <a:pPr lvl="0" algn="ctr"/>
-            <a:r>
-              <a:rPr lang="ru-RU" sz="4400" dirty="0" smtClean="0">
-                <a:solidFill>
-                  <a:schemeClr val="bg1"/>
-                </a:solidFill>
-              </a:rPr>
-              <a:t>Еще курсы БелХард</a:t>
-            </a:r>
-            <a:endParaRPr lang="en-US" sz="4400" dirty="0">
-              <a:solidFill>
-                <a:schemeClr val="bg1"/>
-              </a:solidFill>
-            </a:endParaRPr>
-          </a:p>
-        </p:txBody>
-      </p:sp>
-      <p:sp>
-        <p:nvSpPr>
-          <p:cNvPr id="2" name="TextBox 1"/>
-          <p:cNvSpPr txBox="1"/>
-          <p:nvPr/>
-        </p:nvSpPr>
-        <p:spPr>
-          <a:xfrm>
-            <a:off x="251520" y="1450519"/>
-            <a:ext cx="8640960" cy="2062103"/>
-          </a:xfrm>
-          <a:prstGeom prst="rect">
-            <a:avLst/>
-          </a:prstGeom>
-          <a:noFill/>
-        </p:spPr>
-        <p:txBody>
-          <a:bodyPr wrap="square" rtlCol="0">
-            <a:spAutoFit/>
-          </a:bodyPr>
-          <a:lstStyle/>
-          <a:p>
-            <a:pPr marL="457200" indent="-457200">
-              <a:buFont typeface="Arial" pitchFamily="34" charset="0"/>
-              <a:buChar char="•"/>
-            </a:pPr>
-            <a:r>
-              <a:rPr lang="en-US" sz="3200" dirty="0" smtClean="0"/>
-              <a:t>C, C++</a:t>
-            </a:r>
-          </a:p>
-          <a:p>
-            <a:pPr marL="457200" indent="-457200">
-              <a:buFont typeface="Arial" pitchFamily="34" charset="0"/>
-              <a:buChar char="•"/>
-            </a:pPr>
-            <a:r>
-              <a:rPr lang="en-US" sz="3200" dirty="0" smtClean="0"/>
-              <a:t>Java – </a:t>
-            </a:r>
-            <a:r>
-              <a:rPr lang="ru-RU" sz="3200" dirty="0" smtClean="0"/>
-              <a:t>основы и продвинутый курс</a:t>
-            </a:r>
-            <a:endParaRPr lang="en-US" sz="3200" dirty="0" smtClean="0"/>
-          </a:p>
-          <a:p>
-            <a:pPr marL="457200" indent="-457200">
-              <a:buFont typeface="Arial" pitchFamily="34" charset="0"/>
-              <a:buChar char="•"/>
-            </a:pPr>
-            <a:r>
-              <a:rPr lang="ru-RU" sz="3200" dirty="0" smtClean="0"/>
-              <a:t>Мобильные приложения – </a:t>
-            </a:r>
-            <a:r>
-              <a:rPr lang="en-US" sz="3200" dirty="0" smtClean="0"/>
-              <a:t>Android </a:t>
-            </a:r>
-            <a:r>
-              <a:rPr lang="ru-RU" sz="3200" dirty="0" smtClean="0"/>
-              <a:t>и </a:t>
-            </a:r>
-            <a:r>
-              <a:rPr lang="en-US" sz="3200" dirty="0" smtClean="0"/>
-              <a:t>iPhone</a:t>
-            </a:r>
-            <a:endParaRPr lang="ru-RU" sz="3200" dirty="0" smtClean="0"/>
-          </a:p>
-          <a:p>
-            <a:pPr marL="457200" indent="-457200">
-              <a:buFont typeface="Arial" pitchFamily="34" charset="0"/>
-              <a:buChar char="•"/>
-            </a:pPr>
-            <a:r>
-              <a:rPr lang="ru-RU" sz="3200" dirty="0" smtClean="0"/>
-              <a:t>Тестирование приложений</a:t>
-            </a:r>
-            <a:endParaRPr lang="ru-RU" sz="3200" dirty="0"/>
-          </a:p>
-        </p:txBody>
-      </p:sp>
-    </p:spTree>
-    <p:extLst>
-      <p:ext uri="{BB962C8B-B14F-4D97-AF65-F5344CB8AC3E}">
-        <p14:creationId xmlns:p14="http://schemas.microsoft.com/office/powerpoint/2010/main" val="1126659838"/>
-      </p:ext>
-    </p:extLst>
-  </p:cSld>
-  <p:clrMapOvr>
-    <a:masterClrMapping/>
-  </p:clrMapOvr>
-  <p:timing>
-    <p:tnLst>
-      <p:par>
-        <p:cTn id="1" dur="indefinite" restart="never" nodeType="tmRoot"/>
-      </p:par>
-    </p:tnLst>
-  </p:timing>
-</p:sld>
-</file>
-
-<file path=ppt/slides/slide4.xml><?xml version="1.0" encoding="utf-8"?>
-<p:sld xmlns:a="http://schemas.openxmlformats.org/drawingml/2006/main" xmlns:r="http://schemas.openxmlformats.org/officeDocument/2006/relationships" xmlns:p="http://schemas.openxmlformats.org/presentationml/2006/main">
-  <p:cSld>
-    <p:spTree>
-      <p:nvGrpSpPr>
-        <p:cNvPr id="1" name=""/>
-        <p:cNvGrpSpPr/>
-        <p:nvPr/>
-      </p:nvGrpSpPr>
-      <p:grpSpPr>
-        <a:xfrm>
-          <a:off x="0" y="0"/>
-          <a:ext cx="0" cy="0"/>
-          <a:chOff x="0" y="0"/>
-          <a:chExt cx="0" cy="0"/>
-        </a:xfrm>
-      </p:grpSpPr>
-      <p:sp>
-        <p:nvSpPr>
-          <p:cNvPr id="2" name="Title 1"/>
-          <p:cNvSpPr>
-            <a:spLocks noGrp="1"/>
-          </p:cNvSpPr>
-          <p:nvPr>
-            <p:ph type="title"/>
-          </p:nvPr>
-        </p:nvSpPr>
-        <p:spPr/>
-        <p:txBody>
-          <a:bodyPr/>
-          <a:lstStyle/>
-          <a:p>
-            <a:r>
-              <a:rPr lang="ru-RU" dirty="0" smtClean="0"/>
-              <a:t>Что делать дальше?</a:t>
-            </a:r>
-            <a:endParaRPr lang="ru-RU" dirty="0"/>
-          </a:p>
-        </p:txBody>
-      </p:sp>
-      <p:sp>
-        <p:nvSpPr>
-          <p:cNvPr id="3" name="Content Placeholder 2"/>
-          <p:cNvSpPr>
-            <a:spLocks noGrp="1"/>
-          </p:cNvSpPr>
-          <p:nvPr>
-            <p:ph idx="1"/>
-          </p:nvPr>
-        </p:nvSpPr>
-        <p:spPr/>
-        <p:txBody>
-          <a:bodyPr>
-            <a:normAutofit fontScale="92500" lnSpcReduction="20000"/>
-          </a:bodyPr>
-          <a:lstStyle/>
-          <a:p>
-            <a:r>
-              <a:rPr lang="ru-RU" dirty="0"/>
-              <a:t>Программируйте</a:t>
-            </a:r>
-            <a:r>
-              <a:rPr lang="ru-RU" dirty="0" smtClean="0"/>
-              <a:t>!</a:t>
-            </a:r>
-          </a:p>
-          <a:p>
-            <a:endParaRPr lang="ru-RU" dirty="0" smtClean="0"/>
-          </a:p>
-          <a:p>
-            <a:r>
-              <a:rPr lang="ru-RU" dirty="0" smtClean="0"/>
-              <a:t>Читайте книги и блоги</a:t>
-            </a:r>
-            <a:r>
-              <a:rPr lang="en-US" dirty="0" smtClean="0"/>
-              <a:t>;</a:t>
-            </a:r>
-            <a:endParaRPr lang="ru-RU" dirty="0" smtClean="0"/>
-          </a:p>
-          <a:p>
-            <a:r>
-              <a:rPr lang="ru-RU" dirty="0" smtClean="0"/>
-              <a:t>Смотрите обучающие видео</a:t>
-            </a:r>
-            <a:r>
-              <a:rPr lang="en-US" dirty="0" smtClean="0"/>
-              <a:t>;</a:t>
-            </a:r>
-            <a:endParaRPr lang="ru-RU" dirty="0" smtClean="0"/>
-          </a:p>
-          <a:p>
-            <a:r>
-              <a:rPr lang="ru-RU" dirty="0" smtClean="0"/>
-              <a:t>Слушайте подкасты</a:t>
-            </a:r>
-            <a:r>
-              <a:rPr lang="en-US" dirty="0" smtClean="0"/>
-              <a:t>;</a:t>
-            </a:r>
-            <a:endParaRPr lang="ru-RU" dirty="0" smtClean="0"/>
-          </a:p>
-          <a:p>
-            <a:r>
-              <a:rPr lang="ru-RU" dirty="0" smtClean="0"/>
-              <a:t>Посещайте конференции, пользовательские группы, хакатоны и т.п. события</a:t>
-            </a:r>
-            <a:r>
-              <a:rPr lang="en-US" dirty="0" smtClean="0"/>
-              <a:t>;</a:t>
-            </a:r>
-            <a:endParaRPr lang="ru-RU" dirty="0" smtClean="0"/>
-          </a:p>
-          <a:p>
-            <a:r>
-              <a:rPr lang="ru-RU" dirty="0" smtClean="0"/>
-              <a:t>Не забывайте что кроме </a:t>
-            </a:r>
-            <a:r>
-              <a:rPr lang="en-US" dirty="0" smtClean="0"/>
-              <a:t>.NET/C#</a:t>
-            </a:r>
-            <a:r>
-              <a:rPr lang="ru-RU" dirty="0" smtClean="0"/>
-              <a:t> есть и другие платформы и языки программирования.</a:t>
-            </a:r>
-            <a:r>
-              <a:rPr lang="en-US" dirty="0" smtClean="0"/>
-              <a:t> </a:t>
-            </a:r>
-            <a:r>
-              <a:rPr lang="ru-RU" dirty="0" smtClean="0"/>
-              <a:t>Изучайте их.</a:t>
-            </a:r>
-          </a:p>
-          <a:p>
-            <a:endParaRPr lang="ru-RU" dirty="0" smtClean="0"/>
-          </a:p>
-          <a:p>
-            <a:endParaRPr lang="ru-RU" dirty="0"/>
-          </a:p>
-        </p:txBody>
-      </p:sp>
-    </p:spTree>
-    <p:extLst>
-      <p:ext uri="{BB962C8B-B14F-4D97-AF65-F5344CB8AC3E}">
-        <p14:creationId xmlns:p14="http://schemas.microsoft.com/office/powerpoint/2010/main" val="1949458573"/>
-      </p:ext>
-    </p:extLst>
-  </p:cSld>
-  <p:clrMapOvr>
-    <a:masterClrMapping/>
-  </p:clrMapOvr>
-  <p:timing>
-    <p:tnLst>
-      <p:par>
-        <p:cTn id="1" dur="indefinite" restart="never" nodeType="tmRoot"/>
-      </p:par>
-    </p:tnLst>
-  </p:timing>
-</p:sld>
-</file>
-
-<file path=ppt/slides/slide5.xml><?xml version="1.0" encoding="utf-8"?>
-<p:sld xmlns:a="http://schemas.openxmlformats.org/drawingml/2006/main" xmlns:r="http://schemas.openxmlformats.org/officeDocument/2006/relationships" xmlns:p="http://schemas.openxmlformats.org/presentationml/2006/main">
-  <p:cSld>
-    <p:spTree>
-      <p:nvGrpSpPr>
-        <p:cNvPr id="1" name=""/>
-        <p:cNvGrpSpPr/>
-        <p:nvPr/>
-      </p:nvGrpSpPr>
-      <p:grpSpPr>
-        <a:xfrm>
-          <a:off x="0" y="0"/>
-          <a:ext cx="0" cy="0"/>
-          <a:chOff x="0" y="0"/>
-          <a:chExt cx="0" cy="0"/>
-        </a:xfrm>
-      </p:grpSpPr>
-      <p:sp>
-        <p:nvSpPr>
-          <p:cNvPr id="2" name="Title 1"/>
-          <p:cNvSpPr>
-            <a:spLocks noGrp="1"/>
-          </p:cNvSpPr>
-          <p:nvPr>
-            <p:ph type="title"/>
-          </p:nvPr>
-        </p:nvSpPr>
-        <p:spPr>
-          <a:xfrm>
-            <a:off x="107504" y="116632"/>
-            <a:ext cx="8928992" cy="648072"/>
-          </a:xfrm>
-        </p:spPr>
-        <p:txBody>
-          <a:bodyPr>
-            <a:normAutofit fontScale="90000"/>
-          </a:bodyPr>
-          <a:lstStyle/>
-          <a:p>
-            <a:r>
-              <a:rPr lang="ru-RU" dirty="0" smtClean="0">
-                <a:solidFill>
-                  <a:schemeClr val="bg1"/>
-                </a:solidFill>
-              </a:rPr>
-              <a:t>Блоги</a:t>
-            </a:r>
-            <a:endParaRPr lang="en-US" dirty="0">
-              <a:solidFill>
-                <a:schemeClr val="bg1"/>
-              </a:solidFill>
-            </a:endParaRPr>
-          </a:p>
-        </p:txBody>
-      </p:sp>
-      <p:sp>
-        <p:nvSpPr>
-          <p:cNvPr id="3" name="Content Placeholder 2"/>
-          <p:cNvSpPr>
-            <a:spLocks noGrp="1"/>
-          </p:cNvSpPr>
-          <p:nvPr>
-            <p:ph idx="1"/>
-          </p:nvPr>
-        </p:nvSpPr>
-        <p:spPr>
-          <a:xfrm>
-            <a:off x="457200" y="764704"/>
-            <a:ext cx="8229600" cy="5361459"/>
-          </a:xfrm>
-        </p:spPr>
-        <p:txBody>
-          <a:bodyPr>
-            <a:normAutofit fontScale="92500" lnSpcReduction="10000"/>
-          </a:bodyPr>
-          <a:lstStyle/>
-          <a:p>
-            <a:r>
-              <a:rPr lang="en-US" dirty="0" smtClean="0">
-                <a:solidFill>
-                  <a:schemeClr val="bg1"/>
-                </a:solidFill>
-              </a:rPr>
-              <a:t>.</a:t>
-            </a:r>
-            <a:r>
-              <a:rPr lang="en-US" dirty="0">
-                <a:solidFill>
-                  <a:schemeClr val="bg1"/>
-                </a:solidFill>
-              </a:rPr>
-              <a:t>NET Framework Blog</a:t>
-            </a:r>
-            <a:r>
-              <a:rPr lang="ru-RU" dirty="0">
-                <a:solidFill>
-                  <a:schemeClr val="bg1"/>
-                </a:solidFill>
-              </a:rPr>
-              <a:t>: </a:t>
-            </a:r>
-            <a:r>
-              <a:rPr lang="en-US" dirty="0">
-                <a:solidFill>
-                  <a:schemeClr val="bg1"/>
-                </a:solidFill>
-                <a:hlinkClick r:id="rId2"/>
-              </a:rPr>
-              <a:t>http://blogs.msdn.com/b/dotnet/</a:t>
-            </a:r>
-            <a:endParaRPr lang="ru-RU" dirty="0">
-              <a:solidFill>
-                <a:schemeClr val="bg1"/>
-              </a:solidFill>
-            </a:endParaRPr>
-          </a:p>
-          <a:p>
-            <a:r>
-              <a:rPr lang="en-US" dirty="0">
-                <a:solidFill>
-                  <a:schemeClr val="bg1"/>
-                </a:solidFill>
-              </a:rPr>
-              <a:t>Base Class Library (BCL) Blog</a:t>
-            </a:r>
-            <a:r>
-              <a:rPr lang="ru-RU" dirty="0">
-                <a:solidFill>
-                  <a:schemeClr val="bg1"/>
-                </a:solidFill>
-              </a:rPr>
-              <a:t>: </a:t>
-            </a:r>
-            <a:r>
-              <a:rPr lang="en-US" dirty="0">
-                <a:solidFill>
-                  <a:schemeClr val="bg1"/>
-                </a:solidFill>
-                <a:hlinkClick r:id="rId3"/>
-              </a:rPr>
-              <a:t>http://blogs.msdn.com/b/bclteam/</a:t>
-            </a:r>
-            <a:endParaRPr lang="ru-RU" dirty="0">
-              <a:solidFill>
-                <a:schemeClr val="bg1"/>
-              </a:solidFill>
-            </a:endParaRPr>
-          </a:p>
-          <a:p>
-            <a:r>
-              <a:rPr lang="en-US" dirty="0">
-                <a:solidFill>
-                  <a:schemeClr val="bg1"/>
-                </a:solidFill>
-              </a:rPr>
-              <a:t>ADO.NET Blog</a:t>
-            </a:r>
-            <a:r>
-              <a:rPr lang="ru-RU" dirty="0">
-                <a:solidFill>
-                  <a:schemeClr val="bg1"/>
-                </a:solidFill>
-              </a:rPr>
-              <a:t>: </a:t>
-            </a:r>
-            <a:r>
-              <a:rPr lang="en-US" dirty="0">
-                <a:solidFill>
-                  <a:schemeClr val="bg1"/>
-                </a:solidFill>
-                <a:hlinkClick r:id="rId4"/>
-              </a:rPr>
-              <a:t>http://blogs.msdn.com/b/adonet/</a:t>
-            </a:r>
-            <a:endParaRPr lang="ru-RU" dirty="0">
-              <a:solidFill>
-                <a:schemeClr val="bg1"/>
-              </a:solidFill>
-            </a:endParaRPr>
-          </a:p>
-          <a:p>
-            <a:r>
-              <a:rPr lang="en-US" dirty="0">
-                <a:solidFill>
-                  <a:schemeClr val="bg1"/>
-                </a:solidFill>
-              </a:rPr>
-              <a:t>Parallel Programming with .NET</a:t>
-            </a:r>
-            <a:r>
-              <a:rPr lang="ru-RU" dirty="0">
-                <a:solidFill>
-                  <a:schemeClr val="bg1"/>
-                </a:solidFill>
-              </a:rPr>
-              <a:t>: </a:t>
-            </a:r>
-            <a:r>
-              <a:rPr lang="en-US" dirty="0">
-                <a:solidFill>
-                  <a:schemeClr val="bg1"/>
-                </a:solidFill>
-                <a:hlinkClick r:id="rId5"/>
-              </a:rPr>
-              <a:t>http://blogs.msdn.com/b/pfxteam/</a:t>
-            </a:r>
-            <a:endParaRPr lang="ru-RU" dirty="0">
-              <a:solidFill>
-                <a:schemeClr val="bg1"/>
-              </a:solidFill>
-            </a:endParaRPr>
-          </a:p>
-          <a:p>
-            <a:r>
-              <a:rPr lang="ru-RU" dirty="0">
-                <a:solidFill>
-                  <a:schemeClr val="bg1"/>
-                </a:solidFill>
-              </a:rPr>
-              <a:t>С</a:t>
-            </a:r>
-            <a:r>
-              <a:rPr lang="en-US" dirty="0">
-                <a:solidFill>
-                  <a:schemeClr val="bg1"/>
-                </a:solidFill>
-              </a:rPr>
-              <a:t># Little Wonders</a:t>
-            </a:r>
-            <a:r>
-              <a:rPr lang="ru-RU" dirty="0">
-                <a:solidFill>
-                  <a:schemeClr val="bg1"/>
-                </a:solidFill>
-              </a:rPr>
-              <a:t> -</a:t>
-            </a:r>
-            <a:r>
-              <a:rPr lang="en-US" dirty="0">
-                <a:solidFill>
-                  <a:schemeClr val="bg1"/>
-                </a:solidFill>
-              </a:rPr>
-              <a:t> </a:t>
-            </a:r>
-            <a:r>
-              <a:rPr lang="en-US" dirty="0">
-                <a:solidFill>
-                  <a:schemeClr val="bg1"/>
-                </a:solidFill>
-                <a:hlinkClick r:id="rId6"/>
-              </a:rPr>
-              <a:t>http://</a:t>
-            </a:r>
-            <a:r>
-              <a:rPr lang="en-US" dirty="0" smtClean="0">
-                <a:solidFill>
-                  <a:schemeClr val="bg1"/>
-                </a:solidFill>
-                <a:hlinkClick r:id="rId6"/>
-              </a:rPr>
-              <a:t>blackrabbitcoder.net/category/11989.aspx</a:t>
-            </a:r>
-            <a:endParaRPr lang="ru-RU" dirty="0" smtClean="0">
-              <a:solidFill>
-                <a:schemeClr val="bg1"/>
-              </a:solidFill>
-            </a:endParaRPr>
-          </a:p>
-          <a:p>
-            <a:r>
-              <a:rPr lang="en-US" dirty="0" smtClean="0">
-                <a:solidFill>
-                  <a:schemeClr val="bg1"/>
-                </a:solidFill>
-              </a:rPr>
-              <a:t>Scott </a:t>
-            </a:r>
-            <a:r>
-              <a:rPr lang="en-US" dirty="0" err="1" smtClean="0">
-                <a:solidFill>
-                  <a:schemeClr val="bg1"/>
-                </a:solidFill>
-              </a:rPr>
-              <a:t>Hanselman</a:t>
-            </a:r>
-            <a:r>
-              <a:rPr lang="en-US" dirty="0">
-                <a:solidFill>
-                  <a:schemeClr val="bg1"/>
-                </a:solidFill>
-              </a:rPr>
-              <a:t> - </a:t>
-            </a:r>
-            <a:r>
-              <a:rPr lang="en-US" dirty="0">
-                <a:solidFill>
-                  <a:schemeClr val="bg1"/>
-                </a:solidFill>
-                <a:hlinkClick r:id="rId7"/>
-              </a:rPr>
-              <a:t>http://www.hanselman.com/blog</a:t>
-            </a:r>
-            <a:r>
-              <a:rPr lang="en-US" dirty="0" smtClean="0">
-                <a:solidFill>
-                  <a:schemeClr val="bg1"/>
-                </a:solidFill>
-                <a:hlinkClick r:id="rId7"/>
-              </a:rPr>
-              <a:t>/</a:t>
-            </a:r>
-            <a:endParaRPr lang="en-US" dirty="0" smtClean="0">
-              <a:solidFill>
-                <a:schemeClr val="bg1"/>
-              </a:solidFill>
-            </a:endParaRPr>
-          </a:p>
-          <a:p>
-            <a:endParaRPr lang="ru-RU" dirty="0">
-              <a:solidFill>
-                <a:schemeClr val="bg1"/>
-              </a:solidFill>
-            </a:endParaRPr>
-          </a:p>
-          <a:p>
-            <a:pPr marL="457200" lvl="1" indent="0">
-              <a:buNone/>
-            </a:pPr>
-            <a:endParaRPr lang="en-US" dirty="0">
-              <a:solidFill>
-                <a:schemeClr val="bg1"/>
-              </a:solidFill>
-            </a:endParaRPr>
-          </a:p>
-        </p:txBody>
-      </p:sp>
-    </p:spTree>
-    <p:extLst>
-      <p:ext uri="{BB962C8B-B14F-4D97-AF65-F5344CB8AC3E}">
-        <p14:creationId xmlns:p14="http://schemas.microsoft.com/office/powerpoint/2010/main" val="2211951054"/>
-      </p:ext>
-    </p:extLst>
-  </p:cSld>
-  <p:clrMapOvr>
-    <a:masterClrMapping/>
-  </p:clrMapOvr>
-  <p:timing>
-    <p:tnLst>
-      <p:par>
-        <p:cTn id="1" dur="indefinite" restart="never" nodeType="tmRoot"/>
-      </p:par>
-    </p:tnLst>
-  </p:timing>
-</p:sld>
-</file>
-
-<file path=ppt/slides/slide6.xml><?xml version="1.0" encoding="utf-8"?>
-<p:sld xmlns:a="http://schemas.openxmlformats.org/drawingml/2006/main" xmlns:r="http://schemas.openxmlformats.org/officeDocument/2006/relationships" xmlns:p="http://schemas.openxmlformats.org/presentationml/2006/main">
-  <p:cSld>
-    <p:spTree>
-      <p:nvGrpSpPr>
-        <p:cNvPr id="1" name=""/>
-        <p:cNvGrpSpPr/>
-        <p:nvPr/>
-      </p:nvGrpSpPr>
-      <p:grpSpPr>
-        <a:xfrm>
-          <a:off x="0" y="0"/>
-          <a:ext cx="0" cy="0"/>
-          <a:chOff x="0" y="0"/>
-          <a:chExt cx="0" cy="0"/>
-        </a:xfrm>
-      </p:grpSpPr>
-      <p:sp>
-        <p:nvSpPr>
-          <p:cNvPr id="2" name="Title 1"/>
-          <p:cNvSpPr>
-            <a:spLocks noGrp="1"/>
-          </p:cNvSpPr>
-          <p:nvPr>
-            <p:ph type="title"/>
-          </p:nvPr>
-        </p:nvSpPr>
-        <p:spPr/>
-        <p:txBody>
-          <a:bodyPr/>
-          <a:lstStyle/>
-          <a:p>
-            <a:r>
-              <a:rPr lang="ru-RU" dirty="0" smtClean="0"/>
-              <a:t>Подкасты</a:t>
-            </a:r>
-            <a:endParaRPr lang="en-US" dirty="0"/>
-          </a:p>
-        </p:txBody>
-      </p:sp>
-      <p:sp>
-        <p:nvSpPr>
-          <p:cNvPr id="3" name="Content Placeholder 2"/>
-          <p:cNvSpPr>
-            <a:spLocks noGrp="1"/>
-          </p:cNvSpPr>
-          <p:nvPr>
-            <p:ph idx="1"/>
-          </p:nvPr>
-        </p:nvSpPr>
-        <p:spPr/>
-        <p:txBody>
-          <a:bodyPr/>
-          <a:lstStyle/>
-          <a:p>
-            <a:r>
-              <a:rPr lang="en-US" dirty="0" err="1" smtClean="0"/>
-              <a:t>Hanselminutes</a:t>
-            </a:r>
-            <a:r>
-              <a:rPr lang="en-US" dirty="0" smtClean="0"/>
-              <a:t> (English)</a:t>
-            </a:r>
-            <a:r>
-              <a:rPr lang="en-US" dirty="0"/>
-              <a:t/>
-            </a:r>
-            <a:br>
-              <a:rPr lang="en-US" dirty="0"/>
-            </a:br>
-            <a:r>
-              <a:rPr lang="en-US" dirty="0">
-                <a:hlinkClick r:id="rId2"/>
-              </a:rPr>
-              <a:t>http://www.hanselminutes.com</a:t>
-            </a:r>
-            <a:r>
-              <a:rPr lang="en-US" dirty="0" smtClean="0">
-                <a:hlinkClick r:id="rId2"/>
-              </a:rPr>
-              <a:t>/</a:t>
-            </a:r>
-            <a:endParaRPr lang="en-US" dirty="0" smtClean="0"/>
-          </a:p>
-          <a:p>
-            <a:r>
-              <a:rPr lang="en-US" dirty="0"/>
-              <a:t>.NET Rocks</a:t>
-            </a:r>
-            <a:r>
-              <a:rPr lang="en-US" dirty="0" smtClean="0"/>
-              <a:t>! </a:t>
-            </a:r>
-            <a:r>
-              <a:rPr lang="en-US" dirty="0"/>
-              <a:t>(English)</a:t>
-            </a:r>
-            <a:br>
-              <a:rPr lang="en-US" dirty="0"/>
-            </a:br>
-            <a:r>
-              <a:rPr lang="en-US" dirty="0">
-                <a:hlinkClick r:id="rId3"/>
-              </a:rPr>
-              <a:t>http://www.dotnetrocks.com</a:t>
-            </a:r>
-            <a:r>
-              <a:rPr lang="en-US" dirty="0" smtClean="0">
-                <a:hlinkClick r:id="rId3"/>
-              </a:rPr>
-              <a:t>/</a:t>
-            </a:r>
-            <a:endParaRPr lang="en-US" dirty="0" smtClean="0"/>
-          </a:p>
-          <a:p>
-            <a:endParaRPr lang="en-US" dirty="0"/>
-          </a:p>
-        </p:txBody>
-      </p:sp>
-    </p:spTree>
-    <p:extLst>
-      <p:ext uri="{BB962C8B-B14F-4D97-AF65-F5344CB8AC3E}">
-        <p14:creationId xmlns:p14="http://schemas.microsoft.com/office/powerpoint/2010/main" val="2015174044"/>
-      </p:ext>
-    </p:extLst>
-  </p:cSld>
-  <p:clrMapOvr>
-    <a:masterClrMapping/>
-  </p:clrMapOvr>
-  <p:timing>
-    <p:tnLst>
-      <p:par>
-        <p:cTn id="1" dur="indefinite" restart="never" nodeType="tmRoot"/>
-      </p:par>
-    </p:tnLst>
-  </p:timing>
-</p:sld>
-</file>
-
-<file path=ppt/slides/slide7.xml><?xml version="1.0" encoding="utf-8"?>
-<p:sld xmlns:a="http://schemas.openxmlformats.org/drawingml/2006/main" xmlns:r="http://schemas.openxmlformats.org/officeDocument/2006/relationships" xmlns:p="http://schemas.openxmlformats.org/presentationml/2006/main">
-  <p:cSld>
-    <p:spTree>
-      <p:nvGrpSpPr>
-        <p:cNvPr id="1" name=""/>
-        <p:cNvGrpSpPr/>
-        <p:nvPr/>
-      </p:nvGrpSpPr>
-      <p:grpSpPr>
-        <a:xfrm>
-          <a:off x="0" y="0"/>
-          <a:ext cx="0" cy="0"/>
-          <a:chOff x="0" y="0"/>
-          <a:chExt cx="0" cy="0"/>
-        </a:xfrm>
-      </p:grpSpPr>
-      <p:sp>
-        <p:nvSpPr>
-          <p:cNvPr id="2" name="Title 1"/>
-          <p:cNvSpPr>
-            <a:spLocks noGrp="1"/>
-          </p:cNvSpPr>
-          <p:nvPr>
-            <p:ph type="title"/>
-          </p:nvPr>
-        </p:nvSpPr>
-        <p:spPr>
-          <a:xfrm>
-            <a:off x="107504" y="116632"/>
-            <a:ext cx="8928992" cy="648072"/>
-          </a:xfrm>
-        </p:spPr>
-        <p:txBody>
-          <a:bodyPr>
-            <a:normAutofit fontScale="90000"/>
-          </a:bodyPr>
-          <a:lstStyle/>
-          <a:p>
-            <a:r>
-              <a:rPr lang="ru-RU" dirty="0">
-                <a:solidFill>
-                  <a:schemeClr val="bg1"/>
-                </a:solidFill>
-              </a:rPr>
-              <a:t>Задачи по программированию</a:t>
-            </a:r>
-            <a:endParaRPr lang="en-US" dirty="0">
-              <a:solidFill>
-                <a:schemeClr val="bg1"/>
-              </a:solidFill>
-            </a:endParaRPr>
-          </a:p>
-        </p:txBody>
-      </p:sp>
-      <p:sp>
-        <p:nvSpPr>
-          <p:cNvPr id="3" name="Content Placeholder 2"/>
-          <p:cNvSpPr>
-            <a:spLocks noGrp="1"/>
-          </p:cNvSpPr>
-          <p:nvPr>
-            <p:ph idx="1"/>
-          </p:nvPr>
-        </p:nvSpPr>
-        <p:spPr>
-          <a:xfrm>
-            <a:off x="457200" y="764704"/>
-            <a:ext cx="8229600" cy="5361459"/>
-          </a:xfrm>
-        </p:spPr>
-        <p:txBody>
-          <a:bodyPr>
-            <a:normAutofit/>
-          </a:bodyPr>
-          <a:lstStyle/>
-          <a:p>
-            <a:r>
-              <a:rPr lang="ru-RU" dirty="0" smtClean="0">
-                <a:solidFill>
-                  <a:schemeClr val="bg1"/>
-                </a:solidFill>
-              </a:rPr>
-              <a:t>Математические задачи</a:t>
-            </a:r>
-            <a:br>
-              <a:rPr lang="ru-RU" dirty="0" smtClean="0">
-                <a:solidFill>
-                  <a:schemeClr val="bg1"/>
-                </a:solidFill>
-              </a:rPr>
-            </a:br>
-            <a:r>
-              <a:rPr lang="en-US" dirty="0" smtClean="0">
-                <a:solidFill>
-                  <a:schemeClr val="bg1"/>
-                </a:solidFill>
-                <a:hlinkClick r:id="rId2"/>
-              </a:rPr>
-              <a:t>http</a:t>
-            </a:r>
-            <a:r>
-              <a:rPr lang="en-US" dirty="0">
-                <a:solidFill>
-                  <a:schemeClr val="bg1"/>
-                </a:solidFill>
-                <a:hlinkClick r:id="rId2"/>
-              </a:rPr>
-              <a:t>://projecteuler.net</a:t>
-            </a:r>
-            <a:r>
-              <a:rPr lang="en-US" dirty="0" smtClean="0">
-                <a:solidFill>
-                  <a:schemeClr val="bg1"/>
-                </a:solidFill>
-                <a:hlinkClick r:id="rId2"/>
-              </a:rPr>
-              <a:t>/</a:t>
-            </a:r>
-            <a:endParaRPr lang="ru-RU" dirty="0" smtClean="0">
-              <a:solidFill>
-                <a:schemeClr val="bg1"/>
-              </a:solidFill>
-            </a:endParaRPr>
-          </a:p>
-          <a:p>
-            <a:r>
-              <a:rPr lang="ru-RU" dirty="0" smtClean="0">
-                <a:solidFill>
-                  <a:schemeClr val="bg1"/>
-                </a:solidFill>
-              </a:rPr>
-              <a:t>Кодо-дуэли</a:t>
-            </a:r>
-            <a:br>
-              <a:rPr lang="ru-RU" dirty="0" smtClean="0">
-                <a:solidFill>
-                  <a:schemeClr val="bg1"/>
-                </a:solidFill>
-              </a:rPr>
-            </a:br>
-            <a:r>
-              <a:rPr lang="en-US" dirty="0" smtClean="0">
-                <a:solidFill>
-                  <a:schemeClr val="bg1"/>
-                </a:solidFill>
-                <a:hlinkClick r:id="rId3"/>
-              </a:rPr>
-              <a:t>http</a:t>
-            </a:r>
-            <a:r>
-              <a:rPr lang="en-US" dirty="0">
-                <a:solidFill>
-                  <a:schemeClr val="bg1"/>
-                </a:solidFill>
-                <a:hlinkClick r:id="rId3"/>
-              </a:rPr>
-              <a:t>://www.pex4fun.com</a:t>
-            </a:r>
-            <a:r>
-              <a:rPr lang="en-US" dirty="0" smtClean="0">
-                <a:solidFill>
-                  <a:schemeClr val="bg1"/>
-                </a:solidFill>
-                <a:hlinkClick r:id="rId3"/>
-              </a:rPr>
-              <a:t>/</a:t>
-            </a:r>
-            <a:endParaRPr lang="ru-RU" dirty="0" smtClean="0">
-              <a:solidFill>
-                <a:schemeClr val="bg1"/>
-              </a:solidFill>
-            </a:endParaRPr>
-          </a:p>
-          <a:p>
-            <a:endParaRPr lang="ru-RU" dirty="0" smtClean="0">
-              <a:solidFill>
-                <a:schemeClr val="bg1"/>
-              </a:solidFill>
-            </a:endParaRPr>
-          </a:p>
-          <a:p>
-            <a:pPr lvl="1"/>
-            <a:endParaRPr lang="en-US" dirty="0">
-              <a:solidFill>
-                <a:schemeClr val="bg1"/>
-              </a:solidFill>
-            </a:endParaRPr>
-          </a:p>
-        </p:txBody>
-      </p:sp>
-    </p:spTree>
-    <p:extLst>
-      <p:ext uri="{BB962C8B-B14F-4D97-AF65-F5344CB8AC3E}">
-        <p14:creationId xmlns:p14="http://schemas.microsoft.com/office/powerpoint/2010/main" val="1393508030"/>
-      </p:ext>
-    </p:extLst>
-  </p:cSld>
-  <p:clrMapOvr>
-    <a:masterClrMapping/>
-  </p:clrMapOvr>
-  <p:timing>
-    <p:tnLst>
-      <p:par>
-        <p:cTn id="1" dur="indefinite" restart="never" nodeType="tmRoot"/>
-      </p:par>
-    </p:tnLst>
-  </p:timing>
-</p:sld>
-</file>
-
-<file path=ppt/slides/slide8.xml><?xml version="1.0" encoding="utf-8"?>
-<p:sld xmlns:a="http://schemas.openxmlformats.org/drawingml/2006/main" xmlns:r="http://schemas.openxmlformats.org/officeDocument/2006/relationships" xmlns:p="http://schemas.openxmlformats.org/presentationml/2006/main">
-  <p:cSld>
-    <p:spTree>
-      <p:nvGrpSpPr>
-        <p:cNvPr id="1" name=""/>
-        <p:cNvGrpSpPr/>
-        <p:nvPr/>
-      </p:nvGrpSpPr>
-      <p:grpSpPr>
-        <a:xfrm>
-          <a:off x="0" y="0"/>
-          <a:ext cx="0" cy="0"/>
-          <a:chOff x="0" y="0"/>
-          <a:chExt cx="0" cy="0"/>
-        </a:xfrm>
-      </p:grpSpPr>
-      <p:sp>
-        <p:nvSpPr>
-          <p:cNvPr id="2" name="Title 1"/>
-          <p:cNvSpPr>
-            <a:spLocks noGrp="1"/>
-          </p:cNvSpPr>
-          <p:nvPr>
-            <p:ph type="title"/>
-          </p:nvPr>
-        </p:nvSpPr>
-        <p:spPr/>
-        <p:txBody>
-          <a:bodyPr>
-            <a:normAutofit fontScale="90000"/>
-          </a:bodyPr>
-          <a:lstStyle/>
-          <a:p>
-            <a:r>
-              <a:rPr lang="ru-RU" dirty="0" smtClean="0"/>
-              <a:t>Официальная спецификация языка </a:t>
-            </a:r>
-            <a:r>
-              <a:rPr lang="en-US" dirty="0" smtClean="0"/>
-              <a:t>C#</a:t>
-            </a:r>
-            <a:endParaRPr lang="ru-RU" dirty="0"/>
-          </a:p>
-        </p:txBody>
-      </p:sp>
-      <p:sp>
-        <p:nvSpPr>
-          <p:cNvPr id="3" name="Content Placeholder 2"/>
-          <p:cNvSpPr>
-            <a:spLocks noGrp="1"/>
-          </p:cNvSpPr>
-          <p:nvPr>
-            <p:ph idx="1"/>
-          </p:nvPr>
-        </p:nvSpPr>
-        <p:spPr/>
-        <p:txBody>
-          <a:bodyPr/>
-          <a:lstStyle/>
-          <a:p>
-            <a:pPr marL="0" indent="0">
-              <a:buNone/>
-            </a:pPr>
-            <a:r>
-              <a:rPr lang="en-US" dirty="0" smtClean="0">
-                <a:solidFill>
-                  <a:schemeClr val="bg1"/>
-                </a:solidFill>
-              </a:rPr>
-              <a:t>C</a:t>
-            </a:r>
-            <a:r>
-              <a:rPr lang="en-US" dirty="0">
-                <a:solidFill>
-                  <a:schemeClr val="bg1"/>
-                </a:solidFill>
-              </a:rPr>
-              <a:t>:\Program Files (x86)\Microsoft Visual Studio 11.0\VC#\Specifications\1033\ </a:t>
-            </a:r>
-            <a:r>
-              <a:rPr lang="en-US" dirty="0" err="1">
-                <a:solidFill>
-                  <a:schemeClr val="bg1"/>
-                </a:solidFill>
-              </a:rPr>
-              <a:t>CSharp</a:t>
-            </a:r>
-            <a:r>
-              <a:rPr lang="en-US" dirty="0">
-                <a:solidFill>
-                  <a:schemeClr val="bg1"/>
-                </a:solidFill>
-              </a:rPr>
-              <a:t> </a:t>
-            </a:r>
-            <a:r>
-              <a:rPr lang="en-US">
-                <a:solidFill>
-                  <a:schemeClr val="bg1"/>
-                </a:solidFill>
-              </a:rPr>
-              <a:t>Language </a:t>
-            </a:r>
-            <a:r>
-              <a:rPr lang="en-US" smtClean="0">
-                <a:solidFill>
-                  <a:schemeClr val="bg1"/>
-                </a:solidFill>
-              </a:rPr>
-              <a:t>Specification.doc</a:t>
-            </a:r>
-          </a:p>
-          <a:p>
-            <a:pPr marL="0" indent="0">
-              <a:buNone/>
-            </a:pPr>
-            <a:endParaRPr lang="en-US" dirty="0" smtClean="0">
-              <a:solidFill>
-                <a:schemeClr val="bg1"/>
-              </a:solidFill>
-            </a:endParaRPr>
-          </a:p>
-          <a:p>
-            <a:endParaRPr lang="ru-RU" dirty="0"/>
-          </a:p>
-        </p:txBody>
-      </p:sp>
-    </p:spTree>
-    <p:extLst>
-      <p:ext uri="{BB962C8B-B14F-4D97-AF65-F5344CB8AC3E}">
-        <p14:creationId xmlns:p14="http://schemas.microsoft.com/office/powerpoint/2010/main" val="3098128952"/>
-      </p:ext>
-    </p:extLst>
-  </p:cSld>
-  <p:clrMapOvr>
-    <a:masterClrMapping/>
-  </p:clrMapOvr>
-</p:sld>
-</file>
-
-<file path=ppt/slides/slide9.xml><?xml version="1.0" encoding="utf-8"?>
+<file path=ppt/slides/slide10.xml><?xml version="1.0" encoding="utf-8"?>
 <p:sld xmlns:a="http://schemas.openxmlformats.org/drawingml/2006/main" xmlns:r="http://schemas.openxmlformats.org/officeDocument/2006/relationships" xmlns:p="http://schemas.openxmlformats.org/presentationml/2006/main">
   <p:cSld>
     <p:bg>
@@ -4866,6 +3530,1472 @@
       </p:par>
     </p:tnLst>
   </p:timing>
+</p:sld>
+</file>
+
+<file path=ppt/slides/slide2.xml><?xml version="1.0" encoding="utf-8"?>
+<p:sld xmlns:a="http://schemas.openxmlformats.org/drawingml/2006/main" xmlns:r="http://schemas.openxmlformats.org/officeDocument/2006/relationships" xmlns:p="http://schemas.openxmlformats.org/presentationml/2006/main">
+  <p:cSld>
+    <p:spTree>
+      <p:nvGrpSpPr>
+        <p:cNvPr id="1" name=""/>
+        <p:cNvGrpSpPr/>
+        <p:nvPr/>
+      </p:nvGrpSpPr>
+      <p:grpSpPr>
+        <a:xfrm>
+          <a:off x="0" y="0"/>
+          <a:ext cx="0" cy="0"/>
+          <a:chOff x="0" y="0"/>
+          <a:chExt cx="0" cy="0"/>
+        </a:xfrm>
+      </p:grpSpPr>
+      <p:sp>
+        <p:nvSpPr>
+          <p:cNvPr id="3" name="Rectangle 2"/>
+          <p:cNvSpPr/>
+          <p:nvPr/>
+        </p:nvSpPr>
+        <p:spPr>
+          <a:xfrm>
+            <a:off x="251520" y="188640"/>
+            <a:ext cx="8640960" cy="769441"/>
+          </a:xfrm>
+          <a:prstGeom prst="rect">
+            <a:avLst/>
+          </a:prstGeom>
+        </p:spPr>
+        <p:txBody>
+          <a:bodyPr wrap="square">
+            <a:spAutoFit/>
+          </a:bodyPr>
+          <a:lstStyle/>
+          <a:p>
+            <a:pPr lvl="0" algn="ctr"/>
+            <a:r>
+              <a:rPr lang="ru-RU" sz="4400" dirty="0" smtClean="0">
+                <a:solidFill>
+                  <a:schemeClr val="bg1"/>
+                </a:solidFill>
+              </a:rPr>
+              <a:t>Другие </a:t>
+            </a:r>
+            <a:r>
+              <a:rPr lang="ru-RU" sz="4400" dirty="0">
+                <a:solidFill>
+                  <a:schemeClr val="bg1"/>
+                </a:solidFill>
+              </a:rPr>
+              <a:t>курсы </a:t>
+            </a:r>
+            <a:r>
+              <a:rPr lang="ru-RU" sz="4400" dirty="0" smtClean="0">
+                <a:solidFill>
+                  <a:schemeClr val="bg1"/>
+                </a:solidFill>
+              </a:rPr>
+              <a:t>БелХард по </a:t>
+            </a:r>
+            <a:r>
+              <a:rPr lang="en-US" sz="4400" dirty="0" smtClean="0">
+                <a:solidFill>
+                  <a:schemeClr val="bg1"/>
+                </a:solidFill>
+              </a:rPr>
+              <a:t>.NET</a:t>
+            </a:r>
+            <a:endParaRPr lang="en-US" sz="4400" dirty="0">
+              <a:solidFill>
+                <a:schemeClr val="bg1"/>
+              </a:solidFill>
+            </a:endParaRPr>
+          </a:p>
+        </p:txBody>
+      </p:sp>
+      <p:sp>
+        <p:nvSpPr>
+          <p:cNvPr id="2" name="TextBox 1"/>
+          <p:cNvSpPr txBox="1"/>
+          <p:nvPr/>
+        </p:nvSpPr>
+        <p:spPr>
+          <a:xfrm>
+            <a:off x="251520" y="1450519"/>
+            <a:ext cx="8640960" cy="2554545"/>
+          </a:xfrm>
+          <a:prstGeom prst="rect">
+            <a:avLst/>
+          </a:prstGeom>
+          <a:noFill/>
+        </p:spPr>
+        <p:txBody>
+          <a:bodyPr wrap="square" rtlCol="0">
+            <a:spAutoFit/>
+          </a:bodyPr>
+          <a:lstStyle/>
+          <a:p>
+            <a:pPr marL="457200" indent="-457200">
+              <a:buFont typeface="Arial" pitchFamily="34" charset="0"/>
+              <a:buChar char="•"/>
+            </a:pPr>
+            <a:r>
+              <a:rPr lang="ru-RU" sz="3200" dirty="0" smtClean="0"/>
+              <a:t>Создание </a:t>
+            </a:r>
+            <a:r>
+              <a:rPr lang="ru-RU" sz="3200" dirty="0"/>
+              <a:t>веб-приложений в </a:t>
+            </a:r>
+            <a:r>
+              <a:rPr lang="en-US" sz="3200" dirty="0" smtClean="0"/>
+              <a:t>ASP.NET</a:t>
+            </a:r>
+          </a:p>
+          <a:p>
+            <a:pPr marL="914400" lvl="1" indent="-457200">
+              <a:buFont typeface="Arial" pitchFamily="34" charset="0"/>
+              <a:buChar char="•"/>
+            </a:pPr>
+            <a:r>
+              <a:rPr lang="ru-RU" sz="3200" dirty="0" smtClean="0"/>
+              <a:t>Перед этим рекомендуется – «HTML </a:t>
+            </a:r>
+            <a:r>
+              <a:rPr lang="ru-RU" sz="3200" dirty="0"/>
+              <a:t>и CSS. Секреты вёрстки</a:t>
+            </a:r>
+            <a:r>
+              <a:rPr lang="ru-RU" sz="3200" dirty="0" smtClean="0"/>
+              <a:t>.»</a:t>
+            </a:r>
+            <a:endParaRPr lang="ru-RU" sz="3200" dirty="0"/>
+          </a:p>
+          <a:p>
+            <a:pPr marL="457200" indent="-457200">
+              <a:buFont typeface="Arial" pitchFamily="34" charset="0"/>
+              <a:buChar char="•"/>
+            </a:pPr>
+            <a:r>
+              <a:rPr lang="ru-RU" sz="3200" dirty="0"/>
+              <a:t>Windows Phone 7: проектирование и разработка приложений</a:t>
+            </a:r>
+          </a:p>
+        </p:txBody>
+      </p:sp>
+    </p:spTree>
+    <p:extLst>
+      <p:ext uri="{BB962C8B-B14F-4D97-AF65-F5344CB8AC3E}">
+        <p14:creationId xmlns:p14="http://schemas.microsoft.com/office/powerpoint/2010/main" val="1086215874"/>
+      </p:ext>
+    </p:extLst>
+  </p:cSld>
+  <p:clrMapOvr>
+    <a:masterClrMapping/>
+  </p:clrMapOvr>
+  <p:timing>
+    <p:tnLst>
+      <p:par>
+        <p:cTn id="1" dur="indefinite" restart="never" nodeType="tmRoot"/>
+      </p:par>
+    </p:tnLst>
+  </p:timing>
+</p:sld>
+</file>
+
+<file path=ppt/slides/slide3.xml><?xml version="1.0" encoding="utf-8"?>
+<p:sld xmlns:a="http://schemas.openxmlformats.org/drawingml/2006/main" xmlns:r="http://schemas.openxmlformats.org/officeDocument/2006/relationships" xmlns:p="http://schemas.openxmlformats.org/presentationml/2006/main">
+  <p:cSld>
+    <p:spTree>
+      <p:nvGrpSpPr>
+        <p:cNvPr id="1" name=""/>
+        <p:cNvGrpSpPr/>
+        <p:nvPr/>
+      </p:nvGrpSpPr>
+      <p:grpSpPr>
+        <a:xfrm>
+          <a:off x="0" y="0"/>
+          <a:ext cx="0" cy="0"/>
+          <a:chOff x="0" y="0"/>
+          <a:chExt cx="0" cy="0"/>
+        </a:xfrm>
+      </p:grpSpPr>
+      <p:sp>
+        <p:nvSpPr>
+          <p:cNvPr id="3" name="Rectangle 2"/>
+          <p:cNvSpPr/>
+          <p:nvPr/>
+        </p:nvSpPr>
+        <p:spPr>
+          <a:xfrm>
+            <a:off x="251520" y="188640"/>
+            <a:ext cx="8640960" cy="769441"/>
+          </a:xfrm>
+          <a:prstGeom prst="rect">
+            <a:avLst/>
+          </a:prstGeom>
+        </p:spPr>
+        <p:txBody>
+          <a:bodyPr wrap="square">
+            <a:spAutoFit/>
+          </a:bodyPr>
+          <a:lstStyle/>
+          <a:p>
+            <a:pPr lvl="0" algn="ctr"/>
+            <a:r>
+              <a:rPr lang="ru-RU" sz="4400" dirty="0" smtClean="0">
+                <a:solidFill>
+                  <a:schemeClr val="bg1"/>
+                </a:solidFill>
+              </a:rPr>
+              <a:t>Еще курсы БелХард</a:t>
+            </a:r>
+            <a:endParaRPr lang="en-US" sz="4400" dirty="0">
+              <a:solidFill>
+                <a:schemeClr val="bg1"/>
+              </a:solidFill>
+            </a:endParaRPr>
+          </a:p>
+        </p:txBody>
+      </p:sp>
+      <p:sp>
+        <p:nvSpPr>
+          <p:cNvPr id="2" name="TextBox 1"/>
+          <p:cNvSpPr txBox="1"/>
+          <p:nvPr/>
+        </p:nvSpPr>
+        <p:spPr>
+          <a:xfrm>
+            <a:off x="251520" y="1450519"/>
+            <a:ext cx="8640960" cy="2062103"/>
+          </a:xfrm>
+          <a:prstGeom prst="rect">
+            <a:avLst/>
+          </a:prstGeom>
+          <a:noFill/>
+        </p:spPr>
+        <p:txBody>
+          <a:bodyPr wrap="square" rtlCol="0">
+            <a:spAutoFit/>
+          </a:bodyPr>
+          <a:lstStyle/>
+          <a:p>
+            <a:pPr marL="457200" indent="-457200">
+              <a:buFont typeface="Arial" pitchFamily="34" charset="0"/>
+              <a:buChar char="•"/>
+            </a:pPr>
+            <a:r>
+              <a:rPr lang="en-US" sz="3200" dirty="0" smtClean="0"/>
+              <a:t>C, C++</a:t>
+            </a:r>
+          </a:p>
+          <a:p>
+            <a:pPr marL="457200" indent="-457200">
+              <a:buFont typeface="Arial" pitchFamily="34" charset="0"/>
+              <a:buChar char="•"/>
+            </a:pPr>
+            <a:r>
+              <a:rPr lang="en-US" sz="3200" dirty="0" smtClean="0"/>
+              <a:t>Java – </a:t>
+            </a:r>
+            <a:r>
+              <a:rPr lang="ru-RU" sz="3200" dirty="0" smtClean="0"/>
+              <a:t>основы и продвинутый курс</a:t>
+            </a:r>
+            <a:endParaRPr lang="en-US" sz="3200" dirty="0" smtClean="0"/>
+          </a:p>
+          <a:p>
+            <a:pPr marL="457200" indent="-457200">
+              <a:buFont typeface="Arial" pitchFamily="34" charset="0"/>
+              <a:buChar char="•"/>
+            </a:pPr>
+            <a:r>
+              <a:rPr lang="ru-RU" sz="3200" dirty="0" smtClean="0"/>
+              <a:t>Мобильные приложения – </a:t>
+            </a:r>
+            <a:r>
+              <a:rPr lang="en-US" sz="3200" dirty="0" smtClean="0"/>
+              <a:t>Android </a:t>
+            </a:r>
+            <a:r>
+              <a:rPr lang="ru-RU" sz="3200" dirty="0" smtClean="0"/>
+              <a:t>и </a:t>
+            </a:r>
+            <a:r>
+              <a:rPr lang="en-US" sz="3200" dirty="0" smtClean="0"/>
+              <a:t>iPhone</a:t>
+            </a:r>
+            <a:endParaRPr lang="ru-RU" sz="3200" dirty="0" smtClean="0"/>
+          </a:p>
+          <a:p>
+            <a:pPr marL="457200" indent="-457200">
+              <a:buFont typeface="Arial" pitchFamily="34" charset="0"/>
+              <a:buChar char="•"/>
+            </a:pPr>
+            <a:r>
+              <a:rPr lang="ru-RU" sz="3200" dirty="0" smtClean="0"/>
+              <a:t>Тестирование приложений</a:t>
+            </a:r>
+            <a:endParaRPr lang="ru-RU" sz="3200" dirty="0"/>
+          </a:p>
+        </p:txBody>
+      </p:sp>
+    </p:spTree>
+    <p:extLst>
+      <p:ext uri="{BB962C8B-B14F-4D97-AF65-F5344CB8AC3E}">
+        <p14:creationId xmlns:p14="http://schemas.microsoft.com/office/powerpoint/2010/main" val="1126659838"/>
+      </p:ext>
+    </p:extLst>
+  </p:cSld>
+  <p:clrMapOvr>
+    <a:masterClrMapping/>
+  </p:clrMapOvr>
+  <p:timing>
+    <p:tnLst>
+      <p:par>
+        <p:cTn id="1" dur="indefinite" restart="never" nodeType="tmRoot"/>
+      </p:par>
+    </p:tnLst>
+  </p:timing>
+</p:sld>
+</file>
+
+<file path=ppt/slides/slide4.xml><?xml version="1.0" encoding="utf-8"?>
+<p:sld xmlns:a="http://schemas.openxmlformats.org/drawingml/2006/main" xmlns:r="http://schemas.openxmlformats.org/officeDocument/2006/relationships" xmlns:p="http://schemas.openxmlformats.org/presentationml/2006/main">
+  <p:cSld>
+    <p:spTree>
+      <p:nvGrpSpPr>
+        <p:cNvPr id="1" name=""/>
+        <p:cNvGrpSpPr/>
+        <p:nvPr/>
+      </p:nvGrpSpPr>
+      <p:grpSpPr>
+        <a:xfrm>
+          <a:off x="0" y="0"/>
+          <a:ext cx="0" cy="0"/>
+          <a:chOff x="0" y="0"/>
+          <a:chExt cx="0" cy="0"/>
+        </a:xfrm>
+      </p:grpSpPr>
+      <p:sp>
+        <p:nvSpPr>
+          <p:cNvPr id="2" name="Title 1"/>
+          <p:cNvSpPr>
+            <a:spLocks noGrp="1"/>
+          </p:cNvSpPr>
+          <p:nvPr>
+            <p:ph type="title"/>
+          </p:nvPr>
+        </p:nvSpPr>
+        <p:spPr/>
+        <p:txBody>
+          <a:bodyPr/>
+          <a:lstStyle/>
+          <a:p>
+            <a:r>
+              <a:rPr lang="ru-RU" dirty="0" smtClean="0"/>
+              <a:t>Что делать дальше?</a:t>
+            </a:r>
+            <a:endParaRPr lang="ru-RU" dirty="0"/>
+          </a:p>
+        </p:txBody>
+      </p:sp>
+      <p:sp>
+        <p:nvSpPr>
+          <p:cNvPr id="3" name="Content Placeholder 2"/>
+          <p:cNvSpPr>
+            <a:spLocks noGrp="1"/>
+          </p:cNvSpPr>
+          <p:nvPr>
+            <p:ph idx="1"/>
+          </p:nvPr>
+        </p:nvSpPr>
+        <p:spPr/>
+        <p:txBody>
+          <a:bodyPr>
+            <a:normAutofit fontScale="92500" lnSpcReduction="10000"/>
+          </a:bodyPr>
+          <a:lstStyle/>
+          <a:p>
+            <a:r>
+              <a:rPr lang="ru-RU" dirty="0"/>
+              <a:t>ПРОГРАММИРУЙТЕ!</a:t>
+            </a:r>
+            <a:endParaRPr lang="ru-RU" dirty="0" smtClean="0"/>
+          </a:p>
+          <a:p>
+            <a:endParaRPr lang="ru-RU" dirty="0" smtClean="0"/>
+          </a:p>
+          <a:p>
+            <a:r>
+              <a:rPr lang="ru-RU" dirty="0" smtClean="0"/>
+              <a:t>Читайте книги и блоги</a:t>
+            </a:r>
+            <a:r>
+              <a:rPr lang="en-US" dirty="0" smtClean="0"/>
+              <a:t>;</a:t>
+            </a:r>
+            <a:endParaRPr lang="ru-RU" dirty="0" smtClean="0"/>
+          </a:p>
+          <a:p>
+            <a:r>
+              <a:rPr lang="ru-RU" dirty="0" smtClean="0"/>
+              <a:t>Смотрите обучающие видео</a:t>
+            </a:r>
+            <a:r>
+              <a:rPr lang="en-US" dirty="0" smtClean="0"/>
+              <a:t>;</a:t>
+            </a:r>
+            <a:endParaRPr lang="ru-RU" dirty="0" smtClean="0"/>
+          </a:p>
+          <a:p>
+            <a:r>
+              <a:rPr lang="ru-RU" dirty="0" smtClean="0"/>
+              <a:t>Слушайте подкасты</a:t>
+            </a:r>
+            <a:r>
+              <a:rPr lang="en-US" dirty="0" smtClean="0"/>
+              <a:t>;</a:t>
+            </a:r>
+            <a:endParaRPr lang="ru-RU" dirty="0" smtClean="0"/>
+          </a:p>
+          <a:p>
+            <a:r>
+              <a:rPr lang="ru-RU" dirty="0" smtClean="0"/>
+              <a:t>Посещайте конференции, пользовательские группы, хакатоны и </a:t>
+            </a:r>
+            <a:r>
+              <a:rPr lang="ru-RU" dirty="0" smtClean="0"/>
+              <a:t>другие </a:t>
+            </a:r>
+            <a:r>
+              <a:rPr lang="ru-RU" dirty="0" smtClean="0"/>
+              <a:t>события</a:t>
+            </a:r>
+            <a:r>
+              <a:rPr lang="en-US" dirty="0" smtClean="0"/>
+              <a:t>;</a:t>
+            </a:r>
+            <a:endParaRPr lang="ru-RU" dirty="0" smtClean="0"/>
+          </a:p>
+          <a:p>
+            <a:r>
+              <a:rPr lang="ru-RU" dirty="0" smtClean="0"/>
+              <a:t>Изучайте другие языки программирования, технологии и платформы!</a:t>
+            </a:r>
+            <a:endParaRPr lang="ru-RU" dirty="0" smtClean="0"/>
+          </a:p>
+          <a:p>
+            <a:endParaRPr lang="ru-RU" dirty="0" smtClean="0"/>
+          </a:p>
+          <a:p>
+            <a:endParaRPr lang="ru-RU" dirty="0"/>
+          </a:p>
+        </p:txBody>
+      </p:sp>
+    </p:spTree>
+    <p:extLst>
+      <p:ext uri="{BB962C8B-B14F-4D97-AF65-F5344CB8AC3E}">
+        <p14:creationId xmlns:p14="http://schemas.microsoft.com/office/powerpoint/2010/main" val="1949458573"/>
+      </p:ext>
+    </p:extLst>
+  </p:cSld>
+  <p:clrMapOvr>
+    <a:masterClrMapping/>
+  </p:clrMapOvr>
+  <p:timing>
+    <p:tnLst>
+      <p:par>
+        <p:cTn id="1" dur="indefinite" restart="never" nodeType="tmRoot"/>
+      </p:par>
+    </p:tnLst>
+  </p:timing>
+</p:sld>
+</file>
+
+<file path=ppt/slides/slide5.xml><?xml version="1.0" encoding="utf-8"?>
+<p:sld xmlns:a="http://schemas.openxmlformats.org/drawingml/2006/main" xmlns:r="http://schemas.openxmlformats.org/officeDocument/2006/relationships" xmlns:p="http://schemas.openxmlformats.org/presentationml/2006/main">
+  <p:cSld>
+    <p:spTree>
+      <p:nvGrpSpPr>
+        <p:cNvPr id="1" name=""/>
+        <p:cNvGrpSpPr/>
+        <p:nvPr/>
+      </p:nvGrpSpPr>
+      <p:grpSpPr>
+        <a:xfrm>
+          <a:off x="0" y="0"/>
+          <a:ext cx="0" cy="0"/>
+          <a:chOff x="0" y="0"/>
+          <a:chExt cx="0" cy="0"/>
+        </a:xfrm>
+      </p:grpSpPr>
+      <p:sp>
+        <p:nvSpPr>
+          <p:cNvPr id="2" name="Title 1"/>
+          <p:cNvSpPr>
+            <a:spLocks noGrp="1"/>
+          </p:cNvSpPr>
+          <p:nvPr>
+            <p:ph type="title"/>
+          </p:nvPr>
+        </p:nvSpPr>
+        <p:spPr/>
+        <p:txBody>
+          <a:bodyPr/>
+          <a:lstStyle/>
+          <a:p>
+            <a:r>
+              <a:rPr lang="ru-RU" dirty="0" smtClean="0"/>
+              <a:t>Вопросы для самопроверки</a:t>
+            </a:r>
+            <a:endParaRPr lang="en-US" dirty="0"/>
+          </a:p>
+        </p:txBody>
+      </p:sp>
+      <p:sp>
+        <p:nvSpPr>
+          <p:cNvPr id="3" name="Content Placeholder 2"/>
+          <p:cNvSpPr>
+            <a:spLocks noGrp="1"/>
+          </p:cNvSpPr>
+          <p:nvPr>
+            <p:ph idx="1"/>
+          </p:nvPr>
+        </p:nvSpPr>
+        <p:spPr/>
+        <p:txBody>
+          <a:bodyPr/>
+          <a:lstStyle/>
+          <a:p>
+            <a:pPr marL="0" indent="0">
+              <a:buNone/>
+            </a:pPr>
+            <a:r>
+              <a:rPr lang="ru-RU" dirty="0" smtClean="0"/>
+              <a:t>В файле </a:t>
+            </a:r>
+            <a:r>
+              <a:rPr lang="en-US" i="1" dirty="0" smtClean="0">
+                <a:solidFill>
+                  <a:srgbClr val="FFFF99"/>
+                </a:solidFill>
+              </a:rPr>
+              <a:t>self-check-questions.docx</a:t>
+            </a:r>
+            <a:r>
+              <a:rPr lang="ru-RU" dirty="0" smtClean="0"/>
+              <a:t> вы найдете вопросы которые позволят проверить свой уровень знаний о платформе </a:t>
+            </a:r>
+            <a:r>
+              <a:rPr lang="en-US" dirty="0" smtClean="0"/>
+              <a:t>.NET</a:t>
+            </a:r>
+            <a:r>
+              <a:rPr lang="ru-RU" dirty="0" smtClean="0"/>
+              <a:t>.</a:t>
+            </a:r>
+          </a:p>
+          <a:p>
+            <a:pPr marL="0" indent="0">
+              <a:buNone/>
+            </a:pPr>
+            <a:endParaRPr lang="ru-RU" dirty="0"/>
+          </a:p>
+          <a:p>
+            <a:pPr marL="0" indent="0">
+              <a:buNone/>
+            </a:pPr>
+            <a:r>
+              <a:rPr lang="ru-RU" dirty="0" smtClean="0"/>
+              <a:t>Таблица в файле </a:t>
+            </a:r>
+            <a:r>
+              <a:rPr lang="en-US" i="1" dirty="0">
+                <a:solidFill>
+                  <a:srgbClr val="FFFF99"/>
+                </a:solidFill>
+              </a:rPr>
+              <a:t>Programmer Competency </a:t>
+            </a:r>
+            <a:r>
+              <a:rPr lang="en-US" i="1" dirty="0">
+                <a:solidFill>
+                  <a:srgbClr val="FFFF99"/>
+                </a:solidFill>
+              </a:rPr>
+              <a:t>Matrix.docx</a:t>
+            </a:r>
+            <a:r>
+              <a:rPr lang="ru-RU" dirty="0" smtClean="0"/>
+              <a:t> позволит оценить прогресс в различных областях необходимых каждому программисту.</a:t>
+            </a:r>
+          </a:p>
+          <a:p>
+            <a:pPr marL="0" indent="0">
+              <a:buNone/>
+            </a:pPr>
+            <a:endParaRPr lang="en-US" dirty="0"/>
+          </a:p>
+        </p:txBody>
+      </p:sp>
+    </p:spTree>
+    <p:extLst>
+      <p:ext uri="{BB962C8B-B14F-4D97-AF65-F5344CB8AC3E}">
+        <p14:creationId xmlns:p14="http://schemas.microsoft.com/office/powerpoint/2010/main" val="612142936"/>
+      </p:ext>
+    </p:extLst>
+  </p:cSld>
+  <p:clrMapOvr>
+    <a:masterClrMapping/>
+  </p:clrMapOvr>
+</p:sld>
+</file>
+
+<file path=ppt/slides/slide6.xml><?xml version="1.0" encoding="utf-8"?>
+<p:sld xmlns:a="http://schemas.openxmlformats.org/drawingml/2006/main" xmlns:r="http://schemas.openxmlformats.org/officeDocument/2006/relationships" xmlns:p="http://schemas.openxmlformats.org/presentationml/2006/main">
+  <p:cSld>
+    <p:spTree>
+      <p:nvGrpSpPr>
+        <p:cNvPr id="1" name=""/>
+        <p:cNvGrpSpPr/>
+        <p:nvPr/>
+      </p:nvGrpSpPr>
+      <p:grpSpPr>
+        <a:xfrm>
+          <a:off x="0" y="0"/>
+          <a:ext cx="0" cy="0"/>
+          <a:chOff x="0" y="0"/>
+          <a:chExt cx="0" cy="0"/>
+        </a:xfrm>
+      </p:grpSpPr>
+      <p:sp>
+        <p:nvSpPr>
+          <p:cNvPr id="2" name="Title 1"/>
+          <p:cNvSpPr>
+            <a:spLocks noGrp="1"/>
+          </p:cNvSpPr>
+          <p:nvPr>
+            <p:ph type="title"/>
+          </p:nvPr>
+        </p:nvSpPr>
+        <p:spPr>
+          <a:xfrm>
+            <a:off x="107504" y="116632"/>
+            <a:ext cx="8928992" cy="648072"/>
+          </a:xfrm>
+        </p:spPr>
+        <p:txBody>
+          <a:bodyPr>
+            <a:normAutofit fontScale="90000"/>
+          </a:bodyPr>
+          <a:lstStyle/>
+          <a:p>
+            <a:r>
+              <a:rPr lang="ru-RU" dirty="0" smtClean="0">
+                <a:solidFill>
+                  <a:schemeClr val="bg1"/>
+                </a:solidFill>
+              </a:rPr>
+              <a:t>Блоги</a:t>
+            </a:r>
+            <a:endParaRPr lang="en-US" dirty="0">
+              <a:solidFill>
+                <a:schemeClr val="bg1"/>
+              </a:solidFill>
+            </a:endParaRPr>
+          </a:p>
+        </p:txBody>
+      </p:sp>
+      <p:sp>
+        <p:nvSpPr>
+          <p:cNvPr id="3" name="Content Placeholder 2"/>
+          <p:cNvSpPr>
+            <a:spLocks noGrp="1"/>
+          </p:cNvSpPr>
+          <p:nvPr>
+            <p:ph idx="1"/>
+          </p:nvPr>
+        </p:nvSpPr>
+        <p:spPr>
+          <a:xfrm>
+            <a:off x="457200" y="764704"/>
+            <a:ext cx="8229600" cy="5361459"/>
+          </a:xfrm>
+        </p:spPr>
+        <p:txBody>
+          <a:bodyPr>
+            <a:normAutofit fontScale="92500" lnSpcReduction="10000"/>
+          </a:bodyPr>
+          <a:lstStyle/>
+          <a:p>
+            <a:r>
+              <a:rPr lang="en-US" dirty="0" smtClean="0">
+                <a:solidFill>
+                  <a:schemeClr val="bg1"/>
+                </a:solidFill>
+              </a:rPr>
+              <a:t>.</a:t>
+            </a:r>
+            <a:r>
+              <a:rPr lang="en-US" dirty="0">
+                <a:solidFill>
+                  <a:schemeClr val="bg1"/>
+                </a:solidFill>
+              </a:rPr>
+              <a:t>NET Framework Blog</a:t>
+            </a:r>
+            <a:r>
+              <a:rPr lang="ru-RU" dirty="0">
+                <a:solidFill>
+                  <a:schemeClr val="bg1"/>
+                </a:solidFill>
+              </a:rPr>
+              <a:t>: </a:t>
+            </a:r>
+            <a:r>
+              <a:rPr lang="en-US" dirty="0">
+                <a:solidFill>
+                  <a:schemeClr val="bg1"/>
+                </a:solidFill>
+                <a:hlinkClick r:id="rId2"/>
+              </a:rPr>
+              <a:t>http://blogs.msdn.com/b/dotnet/</a:t>
+            </a:r>
+            <a:endParaRPr lang="ru-RU" dirty="0">
+              <a:solidFill>
+                <a:schemeClr val="bg1"/>
+              </a:solidFill>
+            </a:endParaRPr>
+          </a:p>
+          <a:p>
+            <a:r>
+              <a:rPr lang="en-US" dirty="0">
+                <a:solidFill>
+                  <a:schemeClr val="bg1"/>
+                </a:solidFill>
+              </a:rPr>
+              <a:t>Base Class Library (BCL) Blog</a:t>
+            </a:r>
+            <a:r>
+              <a:rPr lang="ru-RU" dirty="0">
+                <a:solidFill>
+                  <a:schemeClr val="bg1"/>
+                </a:solidFill>
+              </a:rPr>
+              <a:t>: </a:t>
+            </a:r>
+            <a:r>
+              <a:rPr lang="en-US" dirty="0">
+                <a:solidFill>
+                  <a:schemeClr val="bg1"/>
+                </a:solidFill>
+                <a:hlinkClick r:id="rId3"/>
+              </a:rPr>
+              <a:t>http://blogs.msdn.com/b/bclteam/</a:t>
+            </a:r>
+            <a:endParaRPr lang="ru-RU" dirty="0">
+              <a:solidFill>
+                <a:schemeClr val="bg1"/>
+              </a:solidFill>
+            </a:endParaRPr>
+          </a:p>
+          <a:p>
+            <a:r>
+              <a:rPr lang="en-US" dirty="0">
+                <a:solidFill>
+                  <a:schemeClr val="bg1"/>
+                </a:solidFill>
+              </a:rPr>
+              <a:t>ADO.NET Blog</a:t>
+            </a:r>
+            <a:r>
+              <a:rPr lang="ru-RU" dirty="0">
+                <a:solidFill>
+                  <a:schemeClr val="bg1"/>
+                </a:solidFill>
+              </a:rPr>
+              <a:t>: </a:t>
+            </a:r>
+            <a:r>
+              <a:rPr lang="en-US" dirty="0">
+                <a:solidFill>
+                  <a:schemeClr val="bg1"/>
+                </a:solidFill>
+                <a:hlinkClick r:id="rId4"/>
+              </a:rPr>
+              <a:t>http://blogs.msdn.com/b/adonet/</a:t>
+            </a:r>
+            <a:endParaRPr lang="ru-RU" dirty="0">
+              <a:solidFill>
+                <a:schemeClr val="bg1"/>
+              </a:solidFill>
+            </a:endParaRPr>
+          </a:p>
+          <a:p>
+            <a:r>
+              <a:rPr lang="en-US" dirty="0">
+                <a:solidFill>
+                  <a:schemeClr val="bg1"/>
+                </a:solidFill>
+              </a:rPr>
+              <a:t>Parallel Programming with .NET</a:t>
+            </a:r>
+            <a:r>
+              <a:rPr lang="ru-RU" dirty="0">
+                <a:solidFill>
+                  <a:schemeClr val="bg1"/>
+                </a:solidFill>
+              </a:rPr>
+              <a:t>: </a:t>
+            </a:r>
+            <a:r>
+              <a:rPr lang="en-US" dirty="0">
+                <a:solidFill>
+                  <a:schemeClr val="bg1"/>
+                </a:solidFill>
+                <a:hlinkClick r:id="rId5"/>
+              </a:rPr>
+              <a:t>http://blogs.msdn.com/b/pfxteam/</a:t>
+            </a:r>
+            <a:endParaRPr lang="ru-RU" dirty="0">
+              <a:solidFill>
+                <a:schemeClr val="bg1"/>
+              </a:solidFill>
+            </a:endParaRPr>
+          </a:p>
+          <a:p>
+            <a:r>
+              <a:rPr lang="ru-RU" dirty="0">
+                <a:solidFill>
+                  <a:schemeClr val="bg1"/>
+                </a:solidFill>
+              </a:rPr>
+              <a:t>С</a:t>
+            </a:r>
+            <a:r>
+              <a:rPr lang="en-US" dirty="0">
+                <a:solidFill>
+                  <a:schemeClr val="bg1"/>
+                </a:solidFill>
+              </a:rPr>
+              <a:t># Little Wonders</a:t>
+            </a:r>
+            <a:r>
+              <a:rPr lang="ru-RU" dirty="0">
+                <a:solidFill>
+                  <a:schemeClr val="bg1"/>
+                </a:solidFill>
+              </a:rPr>
+              <a:t> -</a:t>
+            </a:r>
+            <a:r>
+              <a:rPr lang="en-US" dirty="0">
+                <a:solidFill>
+                  <a:schemeClr val="bg1"/>
+                </a:solidFill>
+              </a:rPr>
+              <a:t> </a:t>
+            </a:r>
+            <a:r>
+              <a:rPr lang="en-US" dirty="0">
+                <a:solidFill>
+                  <a:schemeClr val="bg1"/>
+                </a:solidFill>
+                <a:hlinkClick r:id="rId6"/>
+              </a:rPr>
+              <a:t>http://</a:t>
+            </a:r>
+            <a:r>
+              <a:rPr lang="en-US" dirty="0" smtClean="0">
+                <a:solidFill>
+                  <a:schemeClr val="bg1"/>
+                </a:solidFill>
+                <a:hlinkClick r:id="rId6"/>
+              </a:rPr>
+              <a:t>blackrabbitcoder.net/category/11989.aspx</a:t>
+            </a:r>
+            <a:endParaRPr lang="ru-RU" dirty="0" smtClean="0">
+              <a:solidFill>
+                <a:schemeClr val="bg1"/>
+              </a:solidFill>
+            </a:endParaRPr>
+          </a:p>
+          <a:p>
+            <a:r>
+              <a:rPr lang="en-US" dirty="0" smtClean="0">
+                <a:solidFill>
+                  <a:schemeClr val="bg1"/>
+                </a:solidFill>
+              </a:rPr>
+              <a:t>Scott </a:t>
+            </a:r>
+            <a:r>
+              <a:rPr lang="en-US" dirty="0" err="1" smtClean="0">
+                <a:solidFill>
+                  <a:schemeClr val="bg1"/>
+                </a:solidFill>
+              </a:rPr>
+              <a:t>Hanselman</a:t>
+            </a:r>
+            <a:r>
+              <a:rPr lang="en-US" dirty="0">
+                <a:solidFill>
+                  <a:schemeClr val="bg1"/>
+                </a:solidFill>
+              </a:rPr>
+              <a:t> - </a:t>
+            </a:r>
+            <a:r>
+              <a:rPr lang="en-US" dirty="0">
+                <a:solidFill>
+                  <a:schemeClr val="bg1"/>
+                </a:solidFill>
+                <a:hlinkClick r:id="rId7"/>
+              </a:rPr>
+              <a:t>http://www.hanselman.com/blog</a:t>
+            </a:r>
+            <a:r>
+              <a:rPr lang="en-US" dirty="0" smtClean="0">
+                <a:solidFill>
+                  <a:schemeClr val="bg1"/>
+                </a:solidFill>
+                <a:hlinkClick r:id="rId7"/>
+              </a:rPr>
+              <a:t>/</a:t>
+            </a:r>
+            <a:endParaRPr lang="en-US" dirty="0" smtClean="0">
+              <a:solidFill>
+                <a:schemeClr val="bg1"/>
+              </a:solidFill>
+            </a:endParaRPr>
+          </a:p>
+          <a:p>
+            <a:endParaRPr lang="ru-RU" dirty="0">
+              <a:solidFill>
+                <a:schemeClr val="bg1"/>
+              </a:solidFill>
+            </a:endParaRPr>
+          </a:p>
+          <a:p>
+            <a:pPr marL="457200" lvl="1" indent="0">
+              <a:buNone/>
+            </a:pPr>
+            <a:endParaRPr lang="en-US" dirty="0">
+              <a:solidFill>
+                <a:schemeClr val="bg1"/>
+              </a:solidFill>
+            </a:endParaRPr>
+          </a:p>
+        </p:txBody>
+      </p:sp>
+    </p:spTree>
+    <p:extLst>
+      <p:ext uri="{BB962C8B-B14F-4D97-AF65-F5344CB8AC3E}">
+        <p14:creationId xmlns:p14="http://schemas.microsoft.com/office/powerpoint/2010/main" val="2211951054"/>
+      </p:ext>
+    </p:extLst>
+  </p:cSld>
+  <p:clrMapOvr>
+    <a:masterClrMapping/>
+  </p:clrMapOvr>
+  <p:timing>
+    <p:tnLst>
+      <p:par>
+        <p:cTn id="1" dur="indefinite" restart="never" nodeType="tmRoot"/>
+      </p:par>
+    </p:tnLst>
+  </p:timing>
+</p:sld>
+</file>
+
+<file path=ppt/slides/slide7.xml><?xml version="1.0" encoding="utf-8"?>
+<p:sld xmlns:a="http://schemas.openxmlformats.org/drawingml/2006/main" xmlns:r="http://schemas.openxmlformats.org/officeDocument/2006/relationships" xmlns:p="http://schemas.openxmlformats.org/presentationml/2006/main">
+  <p:cSld>
+    <p:spTree>
+      <p:nvGrpSpPr>
+        <p:cNvPr id="1" name=""/>
+        <p:cNvGrpSpPr/>
+        <p:nvPr/>
+      </p:nvGrpSpPr>
+      <p:grpSpPr>
+        <a:xfrm>
+          <a:off x="0" y="0"/>
+          <a:ext cx="0" cy="0"/>
+          <a:chOff x="0" y="0"/>
+          <a:chExt cx="0" cy="0"/>
+        </a:xfrm>
+      </p:grpSpPr>
+      <p:sp>
+        <p:nvSpPr>
+          <p:cNvPr id="2" name="Title 1"/>
+          <p:cNvSpPr>
+            <a:spLocks noGrp="1"/>
+          </p:cNvSpPr>
+          <p:nvPr>
+            <p:ph type="title"/>
+          </p:nvPr>
+        </p:nvSpPr>
+        <p:spPr/>
+        <p:txBody>
+          <a:bodyPr/>
+          <a:lstStyle/>
+          <a:p>
+            <a:r>
+              <a:rPr lang="ru-RU" dirty="0" smtClean="0"/>
+              <a:t>Подкасты</a:t>
+            </a:r>
+            <a:endParaRPr lang="en-US" dirty="0"/>
+          </a:p>
+        </p:txBody>
+      </p:sp>
+      <p:sp>
+        <p:nvSpPr>
+          <p:cNvPr id="3" name="Content Placeholder 2"/>
+          <p:cNvSpPr>
+            <a:spLocks noGrp="1"/>
+          </p:cNvSpPr>
+          <p:nvPr>
+            <p:ph idx="1"/>
+          </p:nvPr>
+        </p:nvSpPr>
+        <p:spPr/>
+        <p:txBody>
+          <a:bodyPr/>
+          <a:lstStyle/>
+          <a:p>
+            <a:r>
+              <a:rPr lang="en-US" dirty="0" err="1" smtClean="0"/>
+              <a:t>Hanselminutes</a:t>
+            </a:r>
+            <a:r>
+              <a:rPr lang="en-US" dirty="0" smtClean="0"/>
+              <a:t> (English)</a:t>
+            </a:r>
+            <a:r>
+              <a:rPr lang="en-US" dirty="0"/>
+              <a:t/>
+            </a:r>
+            <a:br>
+              <a:rPr lang="en-US" dirty="0"/>
+            </a:br>
+            <a:r>
+              <a:rPr lang="en-US" dirty="0">
+                <a:hlinkClick r:id="rId2"/>
+              </a:rPr>
+              <a:t>http://www.hanselminutes.com</a:t>
+            </a:r>
+            <a:r>
+              <a:rPr lang="en-US" dirty="0" smtClean="0">
+                <a:hlinkClick r:id="rId2"/>
+              </a:rPr>
+              <a:t>/</a:t>
+            </a:r>
+            <a:endParaRPr lang="en-US" dirty="0" smtClean="0"/>
+          </a:p>
+          <a:p>
+            <a:r>
+              <a:rPr lang="en-US" dirty="0"/>
+              <a:t>.NET Rocks</a:t>
+            </a:r>
+            <a:r>
+              <a:rPr lang="en-US" dirty="0" smtClean="0"/>
+              <a:t>! </a:t>
+            </a:r>
+            <a:r>
+              <a:rPr lang="en-US" dirty="0"/>
+              <a:t>(English)</a:t>
+            </a:r>
+            <a:br>
+              <a:rPr lang="en-US" dirty="0"/>
+            </a:br>
+            <a:r>
+              <a:rPr lang="en-US" dirty="0">
+                <a:hlinkClick r:id="rId3"/>
+              </a:rPr>
+              <a:t>http://www.dotnetrocks.com</a:t>
+            </a:r>
+            <a:r>
+              <a:rPr lang="en-US" dirty="0" smtClean="0">
+                <a:hlinkClick r:id="rId3"/>
+              </a:rPr>
+              <a:t>/</a:t>
+            </a:r>
+            <a:endParaRPr lang="en-US" dirty="0" smtClean="0"/>
+          </a:p>
+          <a:p>
+            <a:endParaRPr lang="en-US" dirty="0"/>
+          </a:p>
+        </p:txBody>
+      </p:sp>
+    </p:spTree>
+    <p:extLst>
+      <p:ext uri="{BB962C8B-B14F-4D97-AF65-F5344CB8AC3E}">
+        <p14:creationId xmlns:p14="http://schemas.microsoft.com/office/powerpoint/2010/main" val="2015174044"/>
+      </p:ext>
+    </p:extLst>
+  </p:cSld>
+  <p:clrMapOvr>
+    <a:masterClrMapping/>
+  </p:clrMapOvr>
+  <p:timing>
+    <p:tnLst>
+      <p:par>
+        <p:cTn id="1" dur="indefinite" restart="never" nodeType="tmRoot"/>
+      </p:par>
+    </p:tnLst>
+  </p:timing>
+</p:sld>
+</file>
+
+<file path=ppt/slides/slide8.xml><?xml version="1.0" encoding="utf-8"?>
+<p:sld xmlns:a="http://schemas.openxmlformats.org/drawingml/2006/main" xmlns:r="http://schemas.openxmlformats.org/officeDocument/2006/relationships" xmlns:p="http://schemas.openxmlformats.org/presentationml/2006/main">
+  <p:cSld>
+    <p:spTree>
+      <p:nvGrpSpPr>
+        <p:cNvPr id="1" name=""/>
+        <p:cNvGrpSpPr/>
+        <p:nvPr/>
+      </p:nvGrpSpPr>
+      <p:grpSpPr>
+        <a:xfrm>
+          <a:off x="0" y="0"/>
+          <a:ext cx="0" cy="0"/>
+          <a:chOff x="0" y="0"/>
+          <a:chExt cx="0" cy="0"/>
+        </a:xfrm>
+      </p:grpSpPr>
+      <p:sp>
+        <p:nvSpPr>
+          <p:cNvPr id="2" name="Title 1"/>
+          <p:cNvSpPr>
+            <a:spLocks noGrp="1"/>
+          </p:cNvSpPr>
+          <p:nvPr>
+            <p:ph type="title"/>
+          </p:nvPr>
+        </p:nvSpPr>
+        <p:spPr>
+          <a:xfrm>
+            <a:off x="107504" y="116632"/>
+            <a:ext cx="8928992" cy="648072"/>
+          </a:xfrm>
+        </p:spPr>
+        <p:txBody>
+          <a:bodyPr>
+            <a:normAutofit fontScale="90000"/>
+          </a:bodyPr>
+          <a:lstStyle/>
+          <a:p>
+            <a:r>
+              <a:rPr lang="ru-RU" dirty="0">
+                <a:solidFill>
+                  <a:schemeClr val="bg1"/>
+                </a:solidFill>
+              </a:rPr>
+              <a:t>Задачи по программированию</a:t>
+            </a:r>
+            <a:endParaRPr lang="en-US" dirty="0">
+              <a:solidFill>
+                <a:schemeClr val="bg1"/>
+              </a:solidFill>
+            </a:endParaRPr>
+          </a:p>
+        </p:txBody>
+      </p:sp>
+      <p:sp>
+        <p:nvSpPr>
+          <p:cNvPr id="3" name="Content Placeholder 2"/>
+          <p:cNvSpPr>
+            <a:spLocks noGrp="1"/>
+          </p:cNvSpPr>
+          <p:nvPr>
+            <p:ph idx="1"/>
+          </p:nvPr>
+        </p:nvSpPr>
+        <p:spPr>
+          <a:xfrm>
+            <a:off x="457200" y="764704"/>
+            <a:ext cx="8229600" cy="5361459"/>
+          </a:xfrm>
+        </p:spPr>
+        <p:txBody>
+          <a:bodyPr>
+            <a:normAutofit/>
+          </a:bodyPr>
+          <a:lstStyle/>
+          <a:p>
+            <a:r>
+              <a:rPr lang="ru-RU" dirty="0" smtClean="0">
+                <a:solidFill>
+                  <a:schemeClr val="bg1"/>
+                </a:solidFill>
+              </a:rPr>
+              <a:t>Математические задачи</a:t>
+            </a:r>
+            <a:br>
+              <a:rPr lang="ru-RU" dirty="0" smtClean="0">
+                <a:solidFill>
+                  <a:schemeClr val="bg1"/>
+                </a:solidFill>
+              </a:rPr>
+            </a:br>
+            <a:r>
+              <a:rPr lang="en-US" dirty="0" smtClean="0">
+                <a:solidFill>
+                  <a:schemeClr val="bg1"/>
+                </a:solidFill>
+                <a:hlinkClick r:id="rId2"/>
+              </a:rPr>
+              <a:t>http</a:t>
+            </a:r>
+            <a:r>
+              <a:rPr lang="en-US" dirty="0">
+                <a:solidFill>
+                  <a:schemeClr val="bg1"/>
+                </a:solidFill>
+                <a:hlinkClick r:id="rId2"/>
+              </a:rPr>
+              <a:t>://projecteuler.net</a:t>
+            </a:r>
+            <a:r>
+              <a:rPr lang="en-US" dirty="0" smtClean="0">
+                <a:solidFill>
+                  <a:schemeClr val="bg1"/>
+                </a:solidFill>
+                <a:hlinkClick r:id="rId2"/>
+              </a:rPr>
+              <a:t>/</a:t>
+            </a:r>
+            <a:endParaRPr lang="ru-RU" dirty="0" smtClean="0">
+              <a:solidFill>
+                <a:schemeClr val="bg1"/>
+              </a:solidFill>
+            </a:endParaRPr>
+          </a:p>
+          <a:p>
+            <a:r>
+              <a:rPr lang="ru-RU" dirty="0" smtClean="0">
+                <a:solidFill>
+                  <a:schemeClr val="bg1"/>
+                </a:solidFill>
+              </a:rPr>
+              <a:t>Кодо-дуэли</a:t>
+            </a:r>
+            <a:br>
+              <a:rPr lang="ru-RU" dirty="0" smtClean="0">
+                <a:solidFill>
+                  <a:schemeClr val="bg1"/>
+                </a:solidFill>
+              </a:rPr>
+            </a:br>
+            <a:r>
+              <a:rPr lang="en-US" dirty="0" smtClean="0">
+                <a:solidFill>
+                  <a:schemeClr val="bg1"/>
+                </a:solidFill>
+                <a:hlinkClick r:id="rId3"/>
+              </a:rPr>
+              <a:t>http</a:t>
+            </a:r>
+            <a:r>
+              <a:rPr lang="en-US" dirty="0">
+                <a:solidFill>
+                  <a:schemeClr val="bg1"/>
+                </a:solidFill>
+                <a:hlinkClick r:id="rId3"/>
+              </a:rPr>
+              <a:t>://www.pex4fun.com</a:t>
+            </a:r>
+            <a:r>
+              <a:rPr lang="en-US" dirty="0" smtClean="0">
+                <a:solidFill>
+                  <a:schemeClr val="bg1"/>
+                </a:solidFill>
+                <a:hlinkClick r:id="rId3"/>
+              </a:rPr>
+              <a:t>/</a:t>
+            </a:r>
+            <a:endParaRPr lang="ru-RU" dirty="0" smtClean="0">
+              <a:solidFill>
+                <a:schemeClr val="bg1"/>
+              </a:solidFill>
+            </a:endParaRPr>
+          </a:p>
+          <a:p>
+            <a:endParaRPr lang="ru-RU" dirty="0" smtClean="0">
+              <a:solidFill>
+                <a:schemeClr val="bg1"/>
+              </a:solidFill>
+            </a:endParaRPr>
+          </a:p>
+          <a:p>
+            <a:pPr lvl="1"/>
+            <a:endParaRPr lang="en-US" dirty="0">
+              <a:solidFill>
+                <a:schemeClr val="bg1"/>
+              </a:solidFill>
+            </a:endParaRPr>
+          </a:p>
+        </p:txBody>
+      </p:sp>
+    </p:spTree>
+    <p:extLst>
+      <p:ext uri="{BB962C8B-B14F-4D97-AF65-F5344CB8AC3E}">
+        <p14:creationId xmlns:p14="http://schemas.microsoft.com/office/powerpoint/2010/main" val="1393508030"/>
+      </p:ext>
+    </p:extLst>
+  </p:cSld>
+  <p:clrMapOvr>
+    <a:masterClrMapping/>
+  </p:clrMapOvr>
+  <p:timing>
+    <p:tnLst>
+      <p:par>
+        <p:cTn id="1" dur="indefinite" restart="never" nodeType="tmRoot"/>
+      </p:par>
+    </p:tnLst>
+  </p:timing>
+</p:sld>
+</file>
+
+<file path=ppt/slides/slide9.xml><?xml version="1.0" encoding="utf-8"?>
+<p:sld xmlns:a="http://schemas.openxmlformats.org/drawingml/2006/main" xmlns:r="http://schemas.openxmlformats.org/officeDocument/2006/relationships" xmlns:p="http://schemas.openxmlformats.org/presentationml/2006/main">
+  <p:cSld>
+    <p:spTree>
+      <p:nvGrpSpPr>
+        <p:cNvPr id="1" name=""/>
+        <p:cNvGrpSpPr/>
+        <p:nvPr/>
+      </p:nvGrpSpPr>
+      <p:grpSpPr>
+        <a:xfrm>
+          <a:off x="0" y="0"/>
+          <a:ext cx="0" cy="0"/>
+          <a:chOff x="0" y="0"/>
+          <a:chExt cx="0" cy="0"/>
+        </a:xfrm>
+      </p:grpSpPr>
+      <p:sp>
+        <p:nvSpPr>
+          <p:cNvPr id="2" name="Title 1"/>
+          <p:cNvSpPr>
+            <a:spLocks noGrp="1"/>
+          </p:cNvSpPr>
+          <p:nvPr>
+            <p:ph type="title"/>
+          </p:nvPr>
+        </p:nvSpPr>
+        <p:spPr/>
+        <p:txBody>
+          <a:bodyPr>
+            <a:normAutofit fontScale="90000"/>
+          </a:bodyPr>
+          <a:lstStyle/>
+          <a:p>
+            <a:r>
+              <a:rPr lang="ru-RU" dirty="0" smtClean="0"/>
+              <a:t>Официальная спецификация языка </a:t>
+            </a:r>
+            <a:r>
+              <a:rPr lang="en-US" dirty="0" smtClean="0"/>
+              <a:t>C#</a:t>
+            </a:r>
+            <a:endParaRPr lang="ru-RU" dirty="0"/>
+          </a:p>
+        </p:txBody>
+      </p:sp>
+      <p:sp>
+        <p:nvSpPr>
+          <p:cNvPr id="3" name="Content Placeholder 2"/>
+          <p:cNvSpPr>
+            <a:spLocks noGrp="1"/>
+          </p:cNvSpPr>
+          <p:nvPr>
+            <p:ph idx="1"/>
+          </p:nvPr>
+        </p:nvSpPr>
+        <p:spPr/>
+        <p:txBody>
+          <a:bodyPr/>
+          <a:lstStyle/>
+          <a:p>
+            <a:pPr marL="0" indent="0">
+              <a:buNone/>
+            </a:pPr>
+            <a:r>
+              <a:rPr lang="en-US" dirty="0" smtClean="0">
+                <a:solidFill>
+                  <a:schemeClr val="bg1"/>
+                </a:solidFill>
+              </a:rPr>
+              <a:t>C</a:t>
+            </a:r>
+            <a:r>
+              <a:rPr lang="en-US" dirty="0">
+                <a:solidFill>
+                  <a:schemeClr val="bg1"/>
+                </a:solidFill>
+              </a:rPr>
+              <a:t>:\Program Files (x86)\Microsoft Visual Studio 11.0\VC#\Specifications\1033\ </a:t>
+            </a:r>
+            <a:r>
+              <a:rPr lang="en-US" dirty="0" err="1">
+                <a:solidFill>
+                  <a:schemeClr val="bg1"/>
+                </a:solidFill>
+              </a:rPr>
+              <a:t>CSharp</a:t>
+            </a:r>
+            <a:r>
+              <a:rPr lang="en-US" dirty="0">
+                <a:solidFill>
+                  <a:schemeClr val="bg1"/>
+                </a:solidFill>
+              </a:rPr>
+              <a:t> </a:t>
+            </a:r>
+            <a:r>
+              <a:rPr lang="en-US">
+                <a:solidFill>
+                  <a:schemeClr val="bg1"/>
+                </a:solidFill>
+              </a:rPr>
+              <a:t>Language </a:t>
+            </a:r>
+            <a:r>
+              <a:rPr lang="en-US" smtClean="0">
+                <a:solidFill>
+                  <a:schemeClr val="bg1"/>
+                </a:solidFill>
+              </a:rPr>
+              <a:t>Specification.doc</a:t>
+            </a:r>
+          </a:p>
+          <a:p>
+            <a:pPr marL="0" indent="0">
+              <a:buNone/>
+            </a:pPr>
+            <a:endParaRPr lang="en-US" dirty="0" smtClean="0">
+              <a:solidFill>
+                <a:schemeClr val="bg1"/>
+              </a:solidFill>
+            </a:endParaRPr>
+          </a:p>
+          <a:p>
+            <a:endParaRPr lang="ru-RU" dirty="0"/>
+          </a:p>
+        </p:txBody>
+      </p:sp>
+    </p:spTree>
+    <p:extLst>
+      <p:ext uri="{BB962C8B-B14F-4D97-AF65-F5344CB8AC3E}">
+        <p14:creationId xmlns:p14="http://schemas.microsoft.com/office/powerpoint/2010/main" val="3098128952"/>
+      </p:ext>
+    </p:extLst>
+  </p:cSld>
+  <p:clrMapOvr>
+    <a:masterClrMapping/>
+  </p:clrMapOvr>
 </p:sld>
 </file>
 

</xml_diff>

<commit_message>
Added links to open source projects sites
</commit_message>
<xml_diff>
--- a/Presentation/that-is-all-folks.pptx
+++ b/Presentation/that-is-all-folks.pptx
@@ -201,7 +201,7 @@
           <a:p>
             <a:fld id="{B24A7054-7FFB-49F4-A126-5DF6E687FF53}" type="datetimeFigureOut">
               <a:rPr lang="ru-RU" smtClean="0"/>
-              <a:t>22.10.2013</a:t>
+              <a:t>29.10.2013</a:t>
             </a:fld>
             <a:endParaRPr lang="ru-RU"/>
           </a:p>
@@ -1483,7 +1483,7 @@
           <a:p>
             <a:fld id="{8E6E6A2A-E9D3-4A0D-B04A-ABDD367A1E08}" type="datetimeFigureOut">
               <a:rPr lang="ru-RU" smtClean="0"/>
-              <a:t>22.10.2013</a:t>
+              <a:t>29.10.2013</a:t>
             </a:fld>
             <a:endParaRPr lang="ru-RU"/>
           </a:p>
@@ -2928,7 +2928,7 @@
           <a:p>
             <a:fld id="{AC3D3127-B7C4-45E3-9797-C527EC9FDD78}" type="datetimeFigureOut">
               <a:rPr lang="ru-RU" smtClean="0"/>
-              <a:t>22.10.2013</a:t>
+              <a:t>29.10.2013</a:t>
             </a:fld>
             <a:endParaRPr lang="ru-RU"/>
           </a:p>
@@ -3912,7 +3912,7 @@
         <p:spPr/>
         <p:txBody>
           <a:bodyPr>
-            <a:normAutofit fontScale="92500" lnSpcReduction="10000"/>
+            <a:normAutofit fontScale="77500" lnSpcReduction="20000"/>
           </a:bodyPr>
           <a:lstStyle/>
           <a:p>
@@ -3961,20 +3961,33 @@
           <a:p>
             <a:r>
               <a:rPr lang="ru-RU" dirty="0" smtClean="0"/>
-              <a:t>Посещайте конференции, пользовательские группы, хакатоны и </a:t>
-            </a:r>
-            <a:r>
-              <a:rPr lang="ru-RU" dirty="0" smtClean="0"/>
-              <a:t>другие </a:t>
-            </a:r>
-            <a:r>
-              <a:rPr lang="ru-RU" dirty="0" smtClean="0"/>
-              <a:t>события</a:t>
+              <a:t>Посещайте конференции, пользовательские группы, хакатоны и другие события</a:t>
             </a:r>
             <a:r>
               <a:rPr lang="en-US" dirty="0" smtClean="0"/>
               <a:t>;</a:t>
             </a:r>
+          </a:p>
+          <a:p>
+            <a:r>
+              <a:rPr lang="ru-RU" dirty="0" smtClean="0"/>
+              <a:t>Участвуйте в проектах с открытым исходным кодом</a:t>
+            </a:r>
+            <a:endParaRPr lang="en-US" dirty="0" smtClean="0"/>
+          </a:p>
+          <a:p>
+            <a:pPr lvl="1"/>
+            <a:r>
+              <a:rPr lang="en-US" dirty="0" smtClean="0"/>
+              <a:t>codeplex.com</a:t>
+            </a:r>
+          </a:p>
+          <a:p>
+            <a:pPr lvl="1"/>
+            <a:r>
+              <a:rPr lang="en-US" dirty="0" smtClean="0"/>
+              <a:t>github.com</a:t>
+            </a:r>
             <a:endParaRPr lang="ru-RU" dirty="0" smtClean="0"/>
           </a:p>
           <a:p>
@@ -3982,7 +3995,6 @@
               <a:rPr lang="ru-RU" dirty="0" smtClean="0"/>
               <a:t>Изучайте другие языки программирования, технологии и платформы!</a:t>
             </a:r>
-            <a:endParaRPr lang="ru-RU" dirty="0" smtClean="0"/>
           </a:p>
           <a:p>
             <a:endParaRPr lang="ru-RU" dirty="0" smtClean="0"/>
@@ -4115,15 +4127,7 @@
                   <a:srgbClr val="FFFF99"/>
                 </a:solidFill>
               </a:rPr>
-              <a:t>Programmer Competency </a:t>
-            </a:r>
-            <a:r>
-              <a:rPr lang="en-US" i="1" dirty="0">
-                <a:solidFill>
-                  <a:srgbClr val="FFFF99"/>
-                </a:solidFill>
-              </a:rPr>
-              <a:t>Matrix.docx</a:t>
+              <a:t>Programmer Competency Matrix.docx</a:t>
             </a:r>
             <a:r>
               <a:rPr lang="ru-RU" dirty="0" smtClean="0"/>

</xml_diff>

<commit_message>
Added link to Microsoft certification
</commit_message>
<xml_diff>
--- a/Presentation/that-is-all-folks.pptx
+++ b/Presentation/that-is-all-folks.pptx
@@ -3789,15 +3789,7 @@
             </a:r>
             <a:r>
               <a:rPr lang="en-US" sz="3200" dirty="0" smtClean="0"/>
-              <a:t>C</a:t>
-            </a:r>
-            <a:r>
-              <a:rPr lang="en-US" sz="3200" dirty="0" smtClean="0"/>
-              <a:t>, C</a:t>
-            </a:r>
-            <a:r>
-              <a:rPr lang="en-US" sz="3200" dirty="0" smtClean="0"/>
-              <a:t>++</a:t>
+              <a:t>C, C++</a:t>
             </a:r>
             <a:r>
               <a:rPr lang="ru-RU" sz="3200" dirty="0" smtClean="0"/>
@@ -3899,11 +3891,7 @@
             </a:pPr>
             <a:r>
               <a:rPr lang="ru-RU" sz="3200" dirty="0" smtClean="0"/>
-              <a:t>Тестирование </a:t>
-            </a:r>
-            <a:r>
-              <a:rPr lang="ru-RU" sz="3200" dirty="0" smtClean="0"/>
-              <a:t>приложений</a:t>
+              <a:t>Тестирование приложений</a:t>
             </a:r>
             <a:endParaRPr lang="en-US" sz="3200" dirty="0" smtClean="0"/>
           </a:p>
@@ -4000,98 +3988,147 @@
             <p:ph idx="1"/>
           </p:nvPr>
         </p:nvSpPr>
-        <p:spPr/>
+        <p:spPr>
+          <a:xfrm>
+            <a:off x="457200" y="1340768"/>
+            <a:ext cx="8229600" cy="5328592"/>
+          </a:xfrm>
+        </p:spPr>
         <p:txBody>
           <a:bodyPr>
-            <a:normAutofit fontScale="77500" lnSpcReduction="20000"/>
+            <a:noAutofit/>
           </a:bodyPr>
           <a:lstStyle/>
           <a:p>
             <a:r>
-              <a:rPr lang="ru-RU" dirty="0"/>
-              <a:t>ПРОГРАММИРУЙТЕ!</a:t>
-            </a:r>
-            <a:endParaRPr lang="ru-RU" dirty="0" smtClean="0"/>
-          </a:p>
-          <a:p>
-            <a:endParaRPr lang="ru-RU" dirty="0" smtClean="0"/>
-          </a:p>
-          <a:p>
-            <a:r>
-              <a:rPr lang="ru-RU" dirty="0" smtClean="0"/>
+              <a:rPr lang="ru-RU" sz="2000" dirty="0"/>
+              <a:t>ПРОГРАММИРУЙТЕ</a:t>
+            </a:r>
+            <a:r>
+              <a:rPr lang="ru-RU" sz="2000" dirty="0" smtClean="0"/>
+              <a:t>!</a:t>
+            </a:r>
+            <a:endParaRPr lang="ru-RU" sz="2000" dirty="0" smtClean="0"/>
+          </a:p>
+          <a:p>
+            <a:r>
+              <a:rPr lang="ru-RU" sz="2000" dirty="0" smtClean="0"/>
               <a:t>Читайте книги и блоги</a:t>
             </a:r>
             <a:r>
-              <a:rPr lang="en-US" dirty="0" smtClean="0"/>
+              <a:rPr lang="en-US" sz="2000" dirty="0" smtClean="0"/>
               <a:t>;</a:t>
             </a:r>
-            <a:endParaRPr lang="ru-RU" dirty="0" smtClean="0"/>
-          </a:p>
-          <a:p>
-            <a:r>
-              <a:rPr lang="ru-RU" dirty="0" smtClean="0"/>
+            <a:endParaRPr lang="ru-RU" sz="2000" dirty="0" smtClean="0"/>
+          </a:p>
+          <a:p>
+            <a:r>
+              <a:rPr lang="ru-RU" sz="2000" dirty="0" smtClean="0"/>
               <a:t>Смотрите обучающие видео</a:t>
             </a:r>
             <a:r>
-              <a:rPr lang="en-US" dirty="0" smtClean="0"/>
+              <a:rPr lang="en-US" sz="2000" dirty="0" smtClean="0"/>
               <a:t>;</a:t>
             </a:r>
-            <a:endParaRPr lang="ru-RU" dirty="0" smtClean="0"/>
-          </a:p>
-          <a:p>
-            <a:r>
-              <a:rPr lang="ru-RU" dirty="0" smtClean="0"/>
+            <a:endParaRPr lang="ru-RU" sz="2000" dirty="0" smtClean="0"/>
+          </a:p>
+          <a:p>
+            <a:r>
+              <a:rPr lang="ru-RU" sz="2000" dirty="0" smtClean="0"/>
               <a:t>Слушайте подкасты</a:t>
             </a:r>
             <a:r>
-              <a:rPr lang="en-US" dirty="0" smtClean="0"/>
+              <a:rPr lang="en-US" sz="2000" dirty="0" smtClean="0"/>
               <a:t>;</a:t>
             </a:r>
-            <a:endParaRPr lang="ru-RU" dirty="0" smtClean="0"/>
-          </a:p>
-          <a:p>
-            <a:r>
-              <a:rPr lang="ru-RU" dirty="0" smtClean="0"/>
+            <a:endParaRPr lang="ru-RU" sz="2000" dirty="0" smtClean="0"/>
+          </a:p>
+          <a:p>
+            <a:r>
+              <a:rPr lang="ru-RU" sz="2000" dirty="0" smtClean="0"/>
               <a:t>Посещайте конференции, пользовательские группы, хакатоны и другие события</a:t>
             </a:r>
             <a:r>
-              <a:rPr lang="en-US" dirty="0" smtClean="0"/>
+              <a:rPr lang="en-US" sz="2000" dirty="0" smtClean="0"/>
               <a:t>;</a:t>
             </a:r>
           </a:p>
           <a:p>
             <a:r>
-              <a:rPr lang="ru-RU" dirty="0" smtClean="0"/>
+              <a:rPr lang="ru-RU" sz="2000" dirty="0" smtClean="0"/>
               <a:t>Участвуйте в проектах с открытым исходным кодом</a:t>
             </a:r>
-            <a:endParaRPr lang="en-US" dirty="0" smtClean="0"/>
+            <a:endParaRPr lang="en-US" sz="2000" dirty="0" smtClean="0"/>
           </a:p>
           <a:p>
             <a:pPr lvl="1"/>
             <a:r>
-              <a:rPr lang="en-US" dirty="0" smtClean="0"/>
+              <a:rPr lang="en-US" sz="2000" dirty="0" smtClean="0"/>
               <a:t>codeplex.com</a:t>
             </a:r>
           </a:p>
           <a:p>
             <a:pPr lvl="1"/>
             <a:r>
-              <a:rPr lang="en-US" dirty="0" smtClean="0"/>
+              <a:rPr lang="en-US" sz="2000" dirty="0" smtClean="0"/>
               <a:t>github.com</a:t>
             </a:r>
-            <a:endParaRPr lang="ru-RU" dirty="0" smtClean="0"/>
-          </a:p>
-          <a:p>
-            <a:r>
-              <a:rPr lang="ru-RU" dirty="0" smtClean="0"/>
-              <a:t>Изучайте другие языки программирования, технологии и платформы!</a:t>
-            </a:r>
-          </a:p>
-          <a:p>
-            <a:endParaRPr lang="ru-RU" dirty="0" smtClean="0"/>
-          </a:p>
-          <a:p>
-            <a:endParaRPr lang="ru-RU" dirty="0"/>
+          </a:p>
+          <a:p>
+            <a:r>
+              <a:rPr lang="ru-RU" sz="2000" dirty="0" smtClean="0"/>
+              <a:t>Сертификация </a:t>
+            </a:r>
+            <a:r>
+              <a:rPr lang="en-US" sz="2000" dirty="0" smtClean="0"/>
+              <a:t>Microsoft</a:t>
+            </a:r>
+          </a:p>
+          <a:p>
+            <a:pPr lvl="1"/>
+            <a:r>
+              <a:rPr lang="en-US" sz="2000" dirty="0" smtClean="0"/>
+              <a:t>MCSD (Microsoft Certified </a:t>
+            </a:r>
+            <a:r>
+              <a:rPr lang="en-US" sz="2000" dirty="0" err="1" smtClean="0"/>
+              <a:t>Soluitons</a:t>
+            </a:r>
+            <a:r>
+              <a:rPr lang="en-US" sz="2000" dirty="0" smtClean="0"/>
+              <a:t> Developer)</a:t>
+            </a:r>
+          </a:p>
+          <a:p>
+            <a:pPr lvl="1"/>
+            <a:r>
+              <a:rPr lang="en-US" sz="2000" dirty="0">
+                <a:hlinkClick r:id="rId2"/>
+              </a:rPr>
+              <a:t>http://</a:t>
+            </a:r>
+            <a:r>
+              <a:rPr lang="en-US" sz="2000" dirty="0" smtClean="0">
+                <a:hlinkClick r:id="rId2"/>
+              </a:rPr>
+              <a:t>www.microsoft.com/learning/en-us/certification-overview.aspx</a:t>
+            </a:r>
+            <a:endParaRPr lang="ru-RU" sz="2000" dirty="0" smtClean="0"/>
+          </a:p>
+          <a:p>
+            <a:r>
+              <a:rPr lang="ru-RU" sz="2000" dirty="0" smtClean="0"/>
+              <a:t>Изучайте </a:t>
+            </a:r>
+            <a:r>
+              <a:rPr lang="ru-RU" sz="2000" dirty="0" smtClean="0"/>
+              <a:t>другие языки программирования, технологии и платформы</a:t>
+            </a:r>
+            <a:r>
+              <a:rPr lang="ru-RU" sz="2000" dirty="0" smtClean="0"/>
+              <a:t>!</a:t>
+            </a:r>
+            <a:endParaRPr lang="ru-RU" sz="2000" dirty="0"/>
           </a:p>
         </p:txBody>
       </p:sp>

</xml_diff>

<commit_message>
Added link to codegolf.stackexchange.com
</commit_message>
<xml_diff>
--- a/Presentation/that-is-all-folks.pptx
+++ b/Presentation/that-is-all-folks.pptx
@@ -201,7 +201,7 @@
           <a:p>
             <a:fld id="{B24A7054-7FFB-49F4-A126-5DF6E687FF53}" type="datetimeFigureOut">
               <a:rPr lang="ru-RU" smtClean="0"/>
-              <a:t>01.11.2013</a:t>
+              <a:t>13.04.2014</a:t>
             </a:fld>
             <a:endParaRPr lang="ru-RU"/>
           </a:p>
@@ -1483,7 +1483,7 @@
           <a:p>
             <a:fld id="{8E6E6A2A-E9D3-4A0D-B04A-ABDD367A1E08}" type="datetimeFigureOut">
               <a:rPr lang="ru-RU" smtClean="0"/>
-              <a:t>01.11.2013</a:t>
+              <a:t>13.04.2014</a:t>
             </a:fld>
             <a:endParaRPr lang="ru-RU"/>
           </a:p>
@@ -2928,7 +2928,7 @@
           <a:p>
             <a:fld id="{AC3D3127-B7C4-45E3-9797-C527EC9FDD78}" type="datetimeFigureOut">
               <a:rPr lang="ru-RU" smtClean="0"/>
-              <a:t>01.11.2013</a:t>
+              <a:t>13.04.2014</a:t>
             </a:fld>
             <a:endParaRPr lang="ru-RU"/>
           </a:p>
@@ -4008,7 +4008,6 @@
               <a:rPr lang="ru-RU" sz="2000" dirty="0" smtClean="0"/>
               <a:t>!</a:t>
             </a:r>
-            <a:endParaRPr lang="ru-RU" sz="2000" dirty="0" smtClean="0"/>
           </a:p>
           <a:p>
             <a:r>
@@ -4118,15 +4117,7 @@
           <a:p>
             <a:r>
               <a:rPr lang="ru-RU" sz="2000" dirty="0" smtClean="0"/>
-              <a:t>Изучайте </a:t>
-            </a:r>
-            <a:r>
-              <a:rPr lang="ru-RU" sz="2000" dirty="0" smtClean="0"/>
-              <a:t>другие языки программирования, технологии и платформы</a:t>
-            </a:r>
-            <a:r>
-              <a:rPr lang="ru-RU" sz="2000" dirty="0" smtClean="0"/>
-              <a:t>!</a:t>
+              <a:t>Изучайте другие языки программирования, технологии и платформы!</a:t>
             </a:r>
             <a:endParaRPr lang="ru-RU" sz="2000" dirty="0"/>
           </a:p>
@@ -4878,26 +4869,15 @@
                 </a:solidFill>
                 <a:hlinkClick r:id="rId2"/>
               </a:rPr>
-              <a:t>http</a:t>
-            </a:r>
-            <a:r>
-              <a:rPr lang="en-US" dirty="0">
-                <a:solidFill>
-                  <a:schemeClr val="bg1"/>
-                </a:solidFill>
-                <a:hlinkClick r:id="rId2"/>
-              </a:rPr>
-              <a:t>://projecteuler.net</a:t>
-            </a:r>
-            <a:r>
-              <a:rPr lang="en-US" dirty="0" smtClean="0">
-                <a:solidFill>
-                  <a:schemeClr val="bg1"/>
-                </a:solidFill>
-                <a:hlinkClick r:id="rId2"/>
-              </a:rPr>
-              <a:t>/</a:t>
-            </a:r>
+              <a:t>http://projecteuler.net</a:t>
+            </a:r>
+            <a:endParaRPr lang="en-US" dirty="0" smtClean="0">
+              <a:solidFill>
+                <a:schemeClr val="bg1"/>
+              </a:solidFill>
+            </a:endParaRPr>
+          </a:p>
+          <a:p>
             <a:endParaRPr lang="ru-RU" dirty="0" smtClean="0">
               <a:solidFill>
                 <a:schemeClr val="bg1"/>
@@ -4913,6 +4893,38 @@
               </a:rPr>
               <a:t>Кодо-дуэли</a:t>
             </a:r>
+            <a:r>
+              <a:rPr lang="en-US" dirty="0" smtClean="0">
+                <a:solidFill>
+                  <a:schemeClr val="bg1"/>
+                </a:solidFill>
+              </a:rPr>
+              <a:t> </a:t>
+            </a:r>
+            <a:r>
+              <a:rPr lang="ru-RU" dirty="0" smtClean="0">
+                <a:solidFill>
+                  <a:schemeClr val="bg1"/>
+                </a:solidFill>
+              </a:rPr>
+              <a:t>на </a:t>
+            </a:r>
+            <a:r>
+              <a:rPr lang="en-US" dirty="0" smtClean="0">
+                <a:solidFill>
+                  <a:schemeClr val="bg1"/>
+                </a:solidFill>
+              </a:rPr>
+              <a:t>C#/VB.NET/F#</a:t>
+            </a:r>
+            <a:r>
+              <a:rPr lang="ru-RU" dirty="0" smtClean="0">
+                <a:solidFill>
+                  <a:schemeClr val="bg1"/>
+                </a:solidFill>
+              </a:rPr>
+              <a:t/>
+            </a:r>
             <a:br>
               <a:rPr lang="ru-RU" dirty="0" smtClean="0">
                 <a:solidFill>
@@ -4927,25 +4939,53 @@
                 </a:solidFill>
                 <a:hlinkClick r:id="rId3"/>
               </a:rPr>
-              <a:t>http</a:t>
-            </a:r>
-            <a:r>
-              <a:rPr lang="en-US" dirty="0">
-                <a:solidFill>
-                  <a:schemeClr val="bg1"/>
-                </a:solidFill>
-                <a:hlinkClick r:id="rId3"/>
-              </a:rPr>
-              <a:t>://www.pex4fun.com</a:t>
+              <a:t>http://www.pex4fun.com</a:t>
+            </a:r>
+            <a:endParaRPr lang="en-US" dirty="0" smtClean="0">
+              <a:solidFill>
+                <a:schemeClr val="bg1"/>
+              </a:solidFill>
+            </a:endParaRPr>
+          </a:p>
+          <a:p>
+            <a:endParaRPr lang="en-US" dirty="0" smtClean="0">
+              <a:solidFill>
+                <a:schemeClr val="bg1"/>
+              </a:solidFill>
+            </a:endParaRPr>
+          </a:p>
+          <a:p>
+            <a:r>
+              <a:rPr lang="ru-RU" dirty="0" smtClean="0">
+                <a:solidFill>
+                  <a:schemeClr val="bg1"/>
+                </a:solidFill>
+              </a:rPr>
+              <a:t>Головоломки от других программистов</a:t>
             </a:r>
             <a:r>
               <a:rPr lang="en-US" dirty="0" smtClean="0">
                 <a:solidFill>
                   <a:schemeClr val="bg1"/>
                 </a:solidFill>
-                <a:hlinkClick r:id="rId3"/>
-              </a:rPr>
-              <a:t>/</a:t>
+              </a:rPr>
+              <a:t/>
+            </a:r>
+            <a:br>
+              <a:rPr lang="en-US" dirty="0" smtClean="0">
+                <a:solidFill>
+                  <a:schemeClr val="bg1"/>
+                </a:solidFill>
+              </a:rPr>
+            </a:br>
+            <a:r>
+              <a:rPr lang="en-US" dirty="0" smtClean="0">
+                <a:solidFill>
+                  <a:schemeClr val="bg1"/>
+                </a:solidFill>
+                <a:hlinkClick r:id="rId4"/>
+              </a:rPr>
+              <a:t>http://codegolf.stackexchange.com</a:t>
             </a:r>
             <a:endParaRPr lang="ru-RU" dirty="0" smtClean="0">
               <a:solidFill>

</xml_diff>

<commit_message>
Added links to video training
</commit_message>
<xml_diff>
--- a/Presentation/that-is-all-folks.pptx
+++ b/Presentation/that-is-all-folks.pptx
@@ -5,7 +5,7 @@
     <p:sldMasterId id="2147483648" r:id="rId1"/>
   </p:sldMasterIdLst>
   <p:notesMasterIdLst>
-    <p:notesMasterId r:id="rId12"/>
+    <p:notesMasterId r:id="rId13"/>
   </p:notesMasterIdLst>
   <p:sldIdLst>
     <p:sldId id="257" r:id="rId2"/>
@@ -15,9 +15,10 @@
     <p:sldId id="270" r:id="rId6"/>
     <p:sldId id="266" r:id="rId7"/>
     <p:sldId id="267" r:id="rId8"/>
-    <p:sldId id="268" r:id="rId9"/>
-    <p:sldId id="269" r:id="rId10"/>
-    <p:sldId id="262" r:id="rId11"/>
+    <p:sldId id="271" r:id="rId9"/>
+    <p:sldId id="268" r:id="rId10"/>
+    <p:sldId id="269" r:id="rId11"/>
+    <p:sldId id="262" r:id="rId12"/>
   </p:sldIdLst>
   <p:sldSz cx="9144000" cy="6858000" type="screen4x3"/>
   <p:notesSz cx="6858000" cy="9144000"/>
@@ -201,7 +202,7 @@
           <a:p>
             <a:fld id="{B24A7054-7FFB-49F4-A126-5DF6E687FF53}" type="datetimeFigureOut">
               <a:rPr lang="ru-RU" smtClean="0"/>
-              <a:t>13.04.2014</a:t>
+              <a:t>21.09.2014</a:t>
             </a:fld>
             <a:endParaRPr lang="ru-RU"/>
           </a:p>
@@ -1483,7 +1484,7 @@
           <a:p>
             <a:fld id="{8E6E6A2A-E9D3-4A0D-B04A-ABDD367A1E08}" type="datetimeFigureOut">
               <a:rPr lang="ru-RU" smtClean="0"/>
-              <a:t>13.04.2014</a:t>
+              <a:t>21.09.2014</a:t>
             </a:fld>
             <a:endParaRPr lang="ru-RU"/>
           </a:p>
@@ -2928,7 +2929,7 @@
           <a:p>
             <a:fld id="{AC3D3127-B7C4-45E3-9797-C527EC9FDD78}" type="datetimeFigureOut">
               <a:rPr lang="ru-RU" smtClean="0"/>
-              <a:t>13.04.2014</a:t>
+              <a:t>21.09.2014</a:t>
             </a:fld>
             <a:endParaRPr lang="ru-RU"/>
           </a:p>
@@ -3485,6 +3486,147 @@
 <file path=ppt/slides/slide10.xml><?xml version="1.0" encoding="utf-8"?>
 <p:sld xmlns:a="http://schemas.openxmlformats.org/drawingml/2006/main" xmlns:r="http://schemas.openxmlformats.org/officeDocument/2006/relationships" xmlns:p="http://schemas.openxmlformats.org/presentationml/2006/main">
   <p:cSld>
+    <p:spTree>
+      <p:nvGrpSpPr>
+        <p:cNvPr id="1" name=""/>
+        <p:cNvGrpSpPr/>
+        <p:nvPr/>
+      </p:nvGrpSpPr>
+      <p:grpSpPr>
+        <a:xfrm>
+          <a:off x="0" y="0"/>
+          <a:ext cx="0" cy="0"/>
+          <a:chOff x="0" y="0"/>
+          <a:chExt cx="0" cy="0"/>
+        </a:xfrm>
+      </p:grpSpPr>
+      <p:sp>
+        <p:nvSpPr>
+          <p:cNvPr id="2" name="Title 1"/>
+          <p:cNvSpPr>
+            <a:spLocks noGrp="1"/>
+          </p:cNvSpPr>
+          <p:nvPr>
+            <p:ph type="title"/>
+          </p:nvPr>
+        </p:nvSpPr>
+        <p:spPr/>
+        <p:txBody>
+          <a:bodyPr>
+            <a:normAutofit fontScale="90000"/>
+          </a:bodyPr>
+          <a:lstStyle/>
+          <a:p>
+            <a:r>
+              <a:rPr lang="ru-RU" dirty="0" smtClean="0"/>
+              <a:t>Официальная спецификация языка </a:t>
+            </a:r>
+            <a:r>
+              <a:rPr lang="en-US" dirty="0" smtClean="0"/>
+              <a:t>C#</a:t>
+            </a:r>
+            <a:endParaRPr lang="ru-RU" dirty="0"/>
+          </a:p>
+        </p:txBody>
+      </p:sp>
+      <p:sp>
+        <p:nvSpPr>
+          <p:cNvPr id="3" name="Content Placeholder 2"/>
+          <p:cNvSpPr>
+            <a:spLocks noGrp="1"/>
+          </p:cNvSpPr>
+          <p:nvPr>
+            <p:ph idx="1"/>
+          </p:nvPr>
+        </p:nvSpPr>
+        <p:spPr/>
+        <p:txBody>
+          <a:bodyPr/>
+          <a:lstStyle/>
+          <a:p>
+            <a:pPr marL="0" indent="0">
+              <a:buNone/>
+            </a:pPr>
+            <a:r>
+              <a:rPr lang="en-US" dirty="0" smtClean="0">
+                <a:solidFill>
+                  <a:schemeClr val="bg1"/>
+                </a:solidFill>
+              </a:rPr>
+              <a:t>C</a:t>
+            </a:r>
+            <a:r>
+              <a:rPr lang="en-US" dirty="0">
+                <a:solidFill>
+                  <a:schemeClr val="bg1"/>
+                </a:solidFill>
+              </a:rPr>
+              <a:t>:\Program Files (x86)\Microsoft Visual Studio 11.0\VC#\Specifications\1033\ </a:t>
+            </a:r>
+            <a:r>
+              <a:rPr lang="en-US" dirty="0" err="1">
+                <a:solidFill>
+                  <a:schemeClr val="bg1"/>
+                </a:solidFill>
+              </a:rPr>
+              <a:t>CSharp</a:t>
+            </a:r>
+            <a:r>
+              <a:rPr lang="en-US" dirty="0">
+                <a:solidFill>
+                  <a:schemeClr val="bg1"/>
+                </a:solidFill>
+              </a:rPr>
+              <a:t> </a:t>
+            </a:r>
+            <a:r>
+              <a:rPr lang="en-US">
+                <a:solidFill>
+                  <a:schemeClr val="bg1"/>
+                </a:solidFill>
+              </a:rPr>
+              <a:t>Language </a:t>
+            </a:r>
+            <a:r>
+              <a:rPr lang="en-US" smtClean="0">
+                <a:solidFill>
+                  <a:schemeClr val="bg1"/>
+                </a:solidFill>
+              </a:rPr>
+              <a:t>Specification.doc</a:t>
+            </a:r>
+          </a:p>
+          <a:p>
+            <a:pPr marL="0" indent="0">
+              <a:buNone/>
+            </a:pPr>
+            <a:endParaRPr lang="en-US" dirty="0" smtClean="0">
+              <a:solidFill>
+                <a:schemeClr val="bg1"/>
+              </a:solidFill>
+            </a:endParaRPr>
+          </a:p>
+          <a:p>
+            <a:endParaRPr lang="ru-RU" dirty="0"/>
+          </a:p>
+        </p:txBody>
+      </p:sp>
+    </p:spTree>
+    <p:extLst>
+      <p:ext uri="{BB962C8B-B14F-4D97-AF65-F5344CB8AC3E}">
+        <p14:creationId xmlns:p14="http://schemas.microsoft.com/office/powerpoint/2010/main" val="3098128952"/>
+      </p:ext>
+    </p:extLst>
+  </p:cSld>
+  <p:clrMapOvr>
+    <a:masterClrMapping/>
+  </p:clrMapOvr>
+</p:sld>
+</file>
+
+<file path=ppt/slides/slide11.xml><?xml version="1.0" encoding="utf-8"?>
+<p:sld xmlns:a="http://schemas.openxmlformats.org/drawingml/2006/main" xmlns:r="http://schemas.openxmlformats.org/officeDocument/2006/relationships" xmlns:p="http://schemas.openxmlformats.org/presentationml/2006/main">
+  <p:cSld>
     <p:bg>
       <p:bgPr>
         <a:blipFill dpi="0" rotWithShape="1">
@@ -4797,31 +4939,16 @@
             <p:ph type="title"/>
           </p:nvPr>
         </p:nvSpPr>
-        <p:spPr>
-          <a:xfrm>
-            <a:off x="107504" y="116632"/>
-            <a:ext cx="8928992" cy="648072"/>
-          </a:xfrm>
-        </p:spPr>
-        <p:txBody>
-          <a:bodyPr>
-            <a:normAutofit fontScale="90000"/>
-          </a:bodyPr>
+        <p:spPr/>
+        <p:txBody>
+          <a:bodyPr/>
           <a:lstStyle/>
           <a:p>
             <a:r>
-              <a:rPr lang="ru-RU" dirty="0">
-                <a:solidFill>
-                  <a:schemeClr val="bg1"/>
-                </a:solidFill>
-              </a:rPr>
-              <a:t>Задачи по программированию</a:t>
-            </a:r>
-            <a:endParaRPr lang="en-US" dirty="0">
-              <a:solidFill>
-                <a:schemeClr val="bg1"/>
-              </a:solidFill>
-            </a:endParaRPr>
+              <a:rPr lang="ru-RU" dirty="0" smtClean="0"/>
+              <a:t>Обучающие видео</a:t>
+            </a:r>
+            <a:endParaRPr lang="ru-RU" dirty="0"/>
           </a:p>
         </p:txBody>
       </p:sp>
@@ -4835,16 +4962,9 @@
             <p:ph idx="1"/>
           </p:nvPr>
         </p:nvSpPr>
-        <p:spPr>
-          <a:xfrm>
-            <a:off x="457200" y="764704"/>
-            <a:ext cx="8229600" cy="5361459"/>
-          </a:xfrm>
-        </p:spPr>
-        <p:txBody>
-          <a:bodyPr>
-            <a:normAutofit/>
-          </a:bodyPr>
+        <p:spPr/>
+        <p:txBody>
+          <a:bodyPr/>
           <a:lstStyle/>
           <a:p>
             <a:r>
@@ -4853,15 +4973,11 @@
                   <a:schemeClr val="bg1"/>
                 </a:solidFill>
               </a:rPr>
-              <a:t>Математические задачи</a:t>
-            </a:r>
-            <a:br>
-              <a:rPr lang="ru-RU" dirty="0" smtClean="0">
-                <a:solidFill>
-                  <a:schemeClr val="bg1"/>
-                </a:solidFill>
-              </a:rPr>
-            </a:br>
+              <a:t>На русском</a:t>
+            </a:r>
+          </a:p>
+          <a:p>
+            <a:pPr lvl="1"/>
             <a:r>
               <a:rPr lang="en-US" dirty="0" smtClean="0">
                 <a:solidFill>
@@ -4869,15 +4985,26 @@
                 </a:solidFill>
                 <a:hlinkClick r:id="rId2"/>
               </a:rPr>
-              <a:t>http://projecteuler.net</a:t>
-            </a:r>
-            <a:endParaRPr lang="en-US" dirty="0" smtClean="0">
-              <a:solidFill>
-                <a:schemeClr val="bg1"/>
-              </a:solidFill>
-            </a:endParaRPr>
-          </a:p>
-          <a:p>
+              <a:t>http</a:t>
+            </a:r>
+            <a:r>
+              <a:rPr lang="en-US" dirty="0">
+                <a:solidFill>
+                  <a:schemeClr val="bg1"/>
+                </a:solidFill>
+                <a:hlinkClick r:id="rId2"/>
+              </a:rPr>
+              <a:t>://</a:t>
+            </a:r>
+            <a:r>
+              <a:rPr lang="en-US" dirty="0" smtClean="0">
+                <a:solidFill>
+                  <a:schemeClr val="bg1"/>
+                </a:solidFill>
+                <a:hlinkClick r:id="rId2"/>
+              </a:rPr>
+              <a:t>techdays.ru</a:t>
+            </a:r>
             <a:endParaRPr lang="ru-RU" dirty="0" smtClean="0">
               <a:solidFill>
                 <a:schemeClr val="bg1"/>
@@ -4891,101 +5018,28 @@
                   <a:schemeClr val="bg1"/>
                 </a:solidFill>
               </a:rPr>
-              <a:t>Кодо-дуэли</a:t>
+              <a:t>На английском</a:t>
+            </a:r>
+          </a:p>
+          <a:p>
+            <a:pPr lvl="1"/>
+            <a:r>
+              <a:rPr lang="en-US" dirty="0">
+                <a:solidFill>
+                  <a:schemeClr val="bg1"/>
+                </a:solidFill>
+                <a:hlinkClick r:id="rId3"/>
+              </a:rPr>
+              <a:t>http://channel9.msdn.com</a:t>
             </a:r>
             <a:r>
               <a:rPr lang="en-US" dirty="0" smtClean="0">
                 <a:solidFill>
                   <a:schemeClr val="bg1"/>
                 </a:solidFill>
-              </a:rPr>
-              <a:t> </a:t>
-            </a:r>
-            <a:r>
-              <a:rPr lang="ru-RU" dirty="0" smtClean="0">
-                <a:solidFill>
-                  <a:schemeClr val="bg1"/>
-                </a:solidFill>
-              </a:rPr>
-              <a:t>на </a:t>
-            </a:r>
-            <a:r>
-              <a:rPr lang="en-US" dirty="0" smtClean="0">
-                <a:solidFill>
-                  <a:schemeClr val="bg1"/>
-                </a:solidFill>
-              </a:rPr>
-              <a:t>C#/VB.NET/F#</a:t>
-            </a:r>
-            <a:r>
-              <a:rPr lang="ru-RU" dirty="0" smtClean="0">
-                <a:solidFill>
-                  <a:schemeClr val="bg1"/>
-                </a:solidFill>
-              </a:rPr>
-              <a:t/>
-            </a:r>
-            <a:br>
-              <a:rPr lang="ru-RU" dirty="0" smtClean="0">
-                <a:solidFill>
-                  <a:schemeClr val="bg1"/>
-                </a:solidFill>
-              </a:rPr>
-            </a:br>
-            <a:r>
-              <a:rPr lang="en-US" dirty="0" smtClean="0">
-                <a:solidFill>
-                  <a:schemeClr val="bg1"/>
-                </a:solidFill>
                 <a:hlinkClick r:id="rId3"/>
               </a:rPr>
-              <a:t>http://www.pex4fun.com</a:t>
-            </a:r>
-            <a:endParaRPr lang="en-US" dirty="0" smtClean="0">
-              <a:solidFill>
-                <a:schemeClr val="bg1"/>
-              </a:solidFill>
-            </a:endParaRPr>
-          </a:p>
-          <a:p>
-            <a:endParaRPr lang="en-US" dirty="0" smtClean="0">
-              <a:solidFill>
-                <a:schemeClr val="bg1"/>
-              </a:solidFill>
-            </a:endParaRPr>
-          </a:p>
-          <a:p>
-            <a:r>
-              <a:rPr lang="ru-RU" dirty="0" smtClean="0">
-                <a:solidFill>
-                  <a:schemeClr val="bg1"/>
-                </a:solidFill>
-              </a:rPr>
-              <a:t>Головоломки от других программистов</a:t>
-            </a:r>
-            <a:r>
-              <a:rPr lang="en-US" dirty="0" smtClean="0">
-                <a:solidFill>
-                  <a:schemeClr val="bg1"/>
-                </a:solidFill>
-              </a:rPr>
-              <a:t/>
-            </a:r>
-            <a:br>
-              <a:rPr lang="en-US" dirty="0" smtClean="0">
-                <a:solidFill>
-                  <a:schemeClr val="bg1"/>
-                </a:solidFill>
-              </a:rPr>
-            </a:br>
-            <a:r>
-              <a:rPr lang="en-US" dirty="0" smtClean="0">
-                <a:solidFill>
-                  <a:schemeClr val="bg1"/>
-                </a:solidFill>
-                <a:hlinkClick r:id="rId4"/>
-              </a:rPr>
-              <a:t>http://codegolf.stackexchange.com</a:t>
+              <a:t>/</a:t>
             </a:r>
             <a:endParaRPr lang="ru-RU" dirty="0" smtClean="0">
               <a:solidFill>
@@ -4994,39 +5048,94 @@
             </a:endParaRPr>
           </a:p>
           <a:p>
-            <a:endParaRPr lang="ru-RU" dirty="0" smtClean="0">
-              <a:solidFill>
-                <a:schemeClr val="bg1"/>
-              </a:solidFill>
-            </a:endParaRPr>
-          </a:p>
-          <a:p>
             <a:pPr lvl="1"/>
-            <a:endParaRPr lang="en-US" dirty="0">
-              <a:solidFill>
-                <a:schemeClr val="bg1"/>
-              </a:solidFill>
-            </a:endParaRPr>
+            <a:r>
+              <a:rPr lang="en-US" dirty="0">
+                <a:solidFill>
+                  <a:schemeClr val="bg1"/>
+                </a:solidFill>
+                <a:hlinkClick r:id="rId4"/>
+              </a:rPr>
+              <a:t>https://</a:t>
+            </a:r>
+            <a:r>
+              <a:rPr lang="en-US" dirty="0" smtClean="0">
+                <a:solidFill>
+                  <a:schemeClr val="bg1"/>
+                </a:solidFill>
+                <a:hlinkClick r:id="rId4"/>
+              </a:rPr>
+              <a:t>www.wintellectnow.com/videos/index</a:t>
+            </a:r>
+            <a:r>
+              <a:rPr lang="ru-RU" dirty="0" smtClean="0">
+                <a:solidFill>
+                  <a:schemeClr val="bg1"/>
+                </a:solidFill>
+              </a:rPr>
+              <a:t/>
+            </a:r>
+            <a:br>
+              <a:rPr lang="ru-RU" dirty="0" smtClean="0">
+                <a:solidFill>
+                  <a:schemeClr val="bg1"/>
+                </a:solidFill>
+              </a:rPr>
+            </a:br>
+            <a:r>
+              <a:rPr lang="ru-RU" dirty="0" smtClean="0">
+                <a:solidFill>
+                  <a:schemeClr val="bg1"/>
+                </a:solidFill>
+              </a:rPr>
+              <a:t>Часть бесплатно, часть платно</a:t>
+            </a:r>
+          </a:p>
+          <a:p>
+            <a:pPr lvl="1"/>
+            <a:r>
+              <a:rPr lang="en-US" dirty="0">
+                <a:solidFill>
+                  <a:schemeClr val="bg1"/>
+                </a:solidFill>
+                <a:hlinkClick r:id="rId5"/>
+              </a:rPr>
+              <a:t>http://pluralsight.com</a:t>
+            </a:r>
+            <a:r>
+              <a:rPr lang="en-US" dirty="0" smtClean="0">
+                <a:solidFill>
+                  <a:schemeClr val="bg1"/>
+                </a:solidFill>
+                <a:hlinkClick r:id="rId5"/>
+              </a:rPr>
+              <a:t>/</a:t>
+            </a:r>
+            <a:r>
+              <a:rPr lang="ru-RU" dirty="0" smtClean="0">
+                <a:solidFill>
+                  <a:schemeClr val="bg1"/>
+                </a:solidFill>
+              </a:rPr>
+              <a:t> (Платный сервис)</a:t>
+            </a:r>
+          </a:p>
+          <a:p>
+            <a:pPr lvl="1"/>
+            <a:endParaRPr lang="ru-RU" dirty="0"/>
           </a:p>
         </p:txBody>
       </p:sp>
     </p:spTree>
     <p:extLst>
       <p:ext uri="{BB962C8B-B14F-4D97-AF65-F5344CB8AC3E}">
-        <p14:creationId xmlns:p14="http://schemas.microsoft.com/office/powerpoint/2010/main" val="1393508030"/>
+        <p14:creationId xmlns:p14="http://schemas.microsoft.com/office/powerpoint/2010/main" val="3706293392"/>
       </p:ext>
     </p:extLst>
   </p:cSld>
   <p:clrMapOvr>
     <a:masterClrMapping/>
   </p:clrMapOvr>
-  <p:timing>
-    <p:tnLst>
-      <p:par>
-        <p:cTn id="1" dur="indefinite" restart="never" nodeType="tmRoot"/>
-      </p:par>
-    </p:tnLst>
-  </p:timing>
 </p:sld>
 </file>
 
@@ -5057,7 +5166,12 @@
             <p:ph type="title"/>
           </p:nvPr>
         </p:nvSpPr>
-        <p:spPr/>
+        <p:spPr>
+          <a:xfrm>
+            <a:off x="107504" y="116632"/>
+            <a:ext cx="8928992" cy="648072"/>
+          </a:xfrm>
+        </p:spPr>
         <p:txBody>
           <a:bodyPr>
             <a:normAutofit fontScale="90000"/>
@@ -5065,14 +5179,18 @@
           <a:lstStyle/>
           <a:p>
             <a:r>
-              <a:rPr lang="ru-RU" dirty="0" smtClean="0"/>
-              <a:t>Официальная спецификация языка </a:t>
-            </a:r>
-            <a:r>
-              <a:rPr lang="en-US" dirty="0" smtClean="0"/>
-              <a:t>C#</a:t>
-            </a:r>
-            <a:endParaRPr lang="ru-RU" dirty="0"/>
+              <a:rPr lang="ru-RU" dirty="0">
+                <a:solidFill>
+                  <a:schemeClr val="bg1"/>
+                </a:solidFill>
+              </a:rPr>
+              <a:t>Задачи по программированию</a:t>
+            </a:r>
+            <a:endParaRPr lang="en-US" dirty="0">
+              <a:solidFill>
+                <a:schemeClr val="bg1"/>
+              </a:solidFill>
+            </a:endParaRPr>
           </a:p>
         </p:txBody>
       </p:sp>
@@ -5086,67 +5204,42 @@
             <p:ph idx="1"/>
           </p:nvPr>
         </p:nvSpPr>
-        <p:spPr/>
-        <p:txBody>
-          <a:bodyPr/>
+        <p:spPr>
+          <a:xfrm>
+            <a:off x="457200" y="764704"/>
+            <a:ext cx="8229600" cy="5361459"/>
+          </a:xfrm>
+        </p:spPr>
+        <p:txBody>
+          <a:bodyPr>
+            <a:normAutofit/>
+          </a:bodyPr>
           <a:lstStyle/>
           <a:p>
-            <a:pPr marL="0" indent="0">
-              <a:buNone/>
-            </a:pPr>
+            <a:r>
+              <a:rPr lang="ru-RU" dirty="0" smtClean="0">
+                <a:solidFill>
+                  <a:schemeClr val="bg1"/>
+                </a:solidFill>
+              </a:rPr>
+              <a:t>Математические задачи</a:t>
+            </a:r>
+            <a:br>
+              <a:rPr lang="ru-RU" dirty="0" smtClean="0">
+                <a:solidFill>
+                  <a:schemeClr val="bg1"/>
+                </a:solidFill>
+              </a:rPr>
+            </a:br>
             <a:r>
               <a:rPr lang="en-US" dirty="0" smtClean="0">
                 <a:solidFill>
                   <a:schemeClr val="bg1"/>
                 </a:solidFill>
-              </a:rPr>
-              <a:t>C</a:t>
-            </a:r>
-            <a:r>
-              <a:rPr lang="en-US" dirty="0">
-                <a:solidFill>
-                  <a:schemeClr val="bg1"/>
-                </a:solidFill>
-              </a:rPr>
-              <a:t>:\Program Files (x86)\Microsoft Visual Studio 11.0\VC#\Specifications\1033\ </a:t>
-            </a:r>
-            <a:r>
-              <a:rPr lang="en-US" dirty="0" err="1">
-                <a:solidFill>
-                  <a:schemeClr val="bg1"/>
-                </a:solidFill>
-              </a:rPr>
-              <a:t>CSharp</a:t>
-            </a:r>
-            <a:r>
-              <a:rPr lang="en-US" dirty="0">
-                <a:solidFill>
-                  <a:schemeClr val="bg1"/>
-                </a:solidFill>
-              </a:rPr>
-              <a:t> </a:t>
-            </a:r>
-            <a:r>
-              <a:rPr lang="en-US">
-                <a:solidFill>
-                  <a:schemeClr val="bg1"/>
-                </a:solidFill>
-              </a:rPr>
-              <a:t>Language </a:t>
-            </a:r>
-            <a:r>
-              <a:rPr lang="en-US" smtClean="0">
-                <a:solidFill>
-                  <a:schemeClr val="bg1"/>
-                </a:solidFill>
-              </a:rPr>
-              <a:t>Specification.doc</a:t>
-            </a:r>
-          </a:p>
-          <a:p>
-            <a:pPr marL="0" indent="0">
-              <a:buNone/>
-            </a:pPr>
+                <a:hlinkClick r:id="rId2"/>
+              </a:rPr>
+              <a:t>http://projecteuler.net</a:t>
+            </a:r>
             <a:endParaRPr lang="en-US" dirty="0" smtClean="0">
               <a:solidFill>
                 <a:schemeClr val="bg1"/>
@@ -5154,20 +5247,155 @@
             </a:endParaRPr>
           </a:p>
           <a:p>
-            <a:endParaRPr lang="ru-RU" dirty="0"/>
+            <a:endParaRPr lang="ru-RU" dirty="0" smtClean="0">
+              <a:solidFill>
+                <a:schemeClr val="bg1"/>
+              </a:solidFill>
+            </a:endParaRPr>
+          </a:p>
+          <a:p>
+            <a:r>
+              <a:rPr lang="ru-RU" dirty="0" smtClean="0">
+                <a:solidFill>
+                  <a:schemeClr val="bg1"/>
+                </a:solidFill>
+              </a:rPr>
+              <a:t>Кодо-дуэли</a:t>
+            </a:r>
+            <a:r>
+              <a:rPr lang="en-US" dirty="0" smtClean="0">
+                <a:solidFill>
+                  <a:schemeClr val="bg1"/>
+                </a:solidFill>
+              </a:rPr>
+              <a:t> </a:t>
+            </a:r>
+            <a:r>
+              <a:rPr lang="ru-RU" dirty="0" smtClean="0">
+                <a:solidFill>
+                  <a:schemeClr val="bg1"/>
+                </a:solidFill>
+              </a:rPr>
+              <a:t>на </a:t>
+            </a:r>
+            <a:r>
+              <a:rPr lang="en-US" dirty="0" smtClean="0">
+                <a:solidFill>
+                  <a:schemeClr val="bg1"/>
+                </a:solidFill>
+              </a:rPr>
+              <a:t>C#/VB.NET/F#</a:t>
+            </a:r>
+            <a:r>
+              <a:rPr lang="ru-RU" dirty="0" smtClean="0">
+                <a:solidFill>
+                  <a:schemeClr val="bg1"/>
+                </a:solidFill>
+              </a:rPr>
+              <a:t/>
+            </a:r>
+            <a:br>
+              <a:rPr lang="ru-RU" dirty="0" smtClean="0">
+                <a:solidFill>
+                  <a:schemeClr val="bg1"/>
+                </a:solidFill>
+              </a:rPr>
+            </a:br>
+            <a:r>
+              <a:rPr lang="en-US" dirty="0" smtClean="0">
+                <a:solidFill>
+                  <a:schemeClr val="bg1"/>
+                </a:solidFill>
+                <a:hlinkClick r:id="rId3"/>
+              </a:rPr>
+              <a:t>http://www.pex4fun.com</a:t>
+            </a:r>
+            <a:endParaRPr lang="en-US" dirty="0" smtClean="0">
+              <a:solidFill>
+                <a:schemeClr val="bg1"/>
+              </a:solidFill>
+            </a:endParaRPr>
+          </a:p>
+          <a:p>
+            <a:endParaRPr lang="en-US" dirty="0" smtClean="0">
+              <a:solidFill>
+                <a:schemeClr val="bg1"/>
+              </a:solidFill>
+            </a:endParaRPr>
+          </a:p>
+          <a:p>
+            <a:r>
+              <a:rPr lang="ru-RU" dirty="0" smtClean="0">
+                <a:solidFill>
+                  <a:schemeClr val="bg1"/>
+                </a:solidFill>
+              </a:rPr>
+              <a:t>Головоломки от других программистов</a:t>
+            </a:r>
+            <a:r>
+              <a:rPr lang="en-US" dirty="0" smtClean="0">
+                <a:solidFill>
+                  <a:schemeClr val="bg1"/>
+                </a:solidFill>
+              </a:rPr>
+              <a:t/>
+            </a:r>
+            <a:br>
+              <a:rPr lang="en-US" dirty="0" smtClean="0">
+                <a:solidFill>
+                  <a:schemeClr val="bg1"/>
+                </a:solidFill>
+              </a:rPr>
+            </a:br>
+            <a:r>
+              <a:rPr lang="en-US" dirty="0" smtClean="0">
+                <a:solidFill>
+                  <a:schemeClr val="bg1"/>
+                </a:solidFill>
+                <a:hlinkClick r:id="rId4"/>
+              </a:rPr>
+              <a:t>http://codegolf.stackexchange.com</a:t>
+            </a:r>
+            <a:endParaRPr lang="ru-RU" dirty="0" smtClean="0">
+              <a:solidFill>
+                <a:schemeClr val="bg1"/>
+              </a:solidFill>
+            </a:endParaRPr>
+          </a:p>
+          <a:p>
+            <a:endParaRPr lang="ru-RU" dirty="0" smtClean="0">
+              <a:solidFill>
+                <a:schemeClr val="bg1"/>
+              </a:solidFill>
+            </a:endParaRPr>
+          </a:p>
+          <a:p>
+            <a:pPr lvl="1"/>
+            <a:endParaRPr lang="en-US" dirty="0">
+              <a:solidFill>
+                <a:schemeClr val="bg1"/>
+              </a:solidFill>
+            </a:endParaRPr>
           </a:p>
         </p:txBody>
       </p:sp>
     </p:spTree>
     <p:extLst>
       <p:ext uri="{BB962C8B-B14F-4D97-AF65-F5344CB8AC3E}">
-        <p14:creationId xmlns:p14="http://schemas.microsoft.com/office/powerpoint/2010/main" val="3098128952"/>
+        <p14:creationId xmlns:p14="http://schemas.microsoft.com/office/powerpoint/2010/main" val="1393508030"/>
       </p:ext>
     </p:extLst>
   </p:cSld>
   <p:clrMapOvr>
     <a:masterClrMapping/>
   </p:clrMapOvr>
+  <p:timing>
+    <p:tnLst>
+      <p:par>
+        <p:cTn id="1" dur="indefinite" restart="never" nodeType="tmRoot"/>
+      </p:par>
+    </p:tnLst>
+  </p:timing>
 </p:sld>
 </file>
 

</xml_diff>

<commit_message>
Added link to acmp.ru
</commit_message>
<xml_diff>
--- a/Presentation/that-is-all-folks.pptx
+++ b/Presentation/that-is-all-folks.pptx
@@ -202,7 +202,7 @@
           <a:p>
             <a:fld id="{B24A7054-7FFB-49F4-A126-5DF6E687FF53}" type="datetimeFigureOut">
               <a:rPr lang="ru-RU" smtClean="0"/>
-              <a:t>21.09.2014</a:t>
+              <a:t>11.12.2014</a:t>
             </a:fld>
             <a:endParaRPr lang="ru-RU"/>
           </a:p>
@@ -1484,7 +1484,7 @@
           <a:p>
             <a:fld id="{8E6E6A2A-E9D3-4A0D-B04A-ABDD367A1E08}" type="datetimeFigureOut">
               <a:rPr lang="ru-RU" smtClean="0"/>
-              <a:t>21.09.2014</a:t>
+              <a:t>11.12.2014</a:t>
             </a:fld>
             <a:endParaRPr lang="ru-RU"/>
           </a:p>
@@ -2929,7 +2929,7 @@
           <a:p>
             <a:fld id="{AC3D3127-B7C4-45E3-9797-C527EC9FDD78}" type="datetimeFigureOut">
               <a:rPr lang="ru-RU" smtClean="0"/>
-              <a:t>21.09.2014</a:t>
+              <a:t>11.12.2014</a:t>
             </a:fld>
             <a:endParaRPr lang="ru-RU"/>
           </a:p>
@@ -5212,7 +5212,7 @@
         </p:spPr>
         <p:txBody>
           <a:bodyPr>
-            <a:normAutofit/>
+            <a:normAutofit fontScale="92500" lnSpcReduction="10000"/>
           </a:bodyPr>
           <a:lstStyle/>
           <a:p>
@@ -5222,13 +5222,23 @@
                   <a:schemeClr val="bg1"/>
                 </a:solidFill>
               </a:rPr>
-              <a:t>Математические задачи</a:t>
+              <a:t>Школа программиста</a:t>
+            </a:r>
+            <a:r>
+              <a:rPr lang="en-US" dirty="0" smtClean="0">
+                <a:solidFill>
+                  <a:schemeClr val="bg1"/>
+                </a:solidFill>
+                <a:hlinkClick r:id="rId2"/>
+              </a:rPr>
+              <a:t/>
             </a:r>
             <a:br>
-              <a:rPr lang="ru-RU" dirty="0" smtClean="0">
-                <a:solidFill>
-                  <a:schemeClr val="bg1"/>
-                </a:solidFill>
+              <a:rPr lang="en-US" dirty="0" smtClean="0">
+                <a:solidFill>
+                  <a:schemeClr val="bg1"/>
+                </a:solidFill>
+                <a:hlinkClick r:id="rId2"/>
               </a:rPr>
             </a:br>
             <a:r>
@@ -5238,7 +5248,25 @@
                 </a:solidFill>
                 <a:hlinkClick r:id="rId2"/>
               </a:rPr>
-              <a:t>http://projecteuler.net</a:t>
+              <a:t>http</a:t>
+            </a:r>
+            <a:r>
+              <a:rPr lang="en-US" dirty="0">
+                <a:solidFill>
+                  <a:schemeClr val="bg1"/>
+                </a:solidFill>
+                <a:hlinkClick r:id="rId2"/>
+              </a:rPr>
+              <a:t>://</a:t>
+            </a:r>
+            <a:r>
+              <a:rPr lang="en-US" dirty="0" smtClean="0">
+                <a:solidFill>
+                  <a:schemeClr val="bg1"/>
+                </a:solidFill>
+                <a:hlinkClick r:id="rId2"/>
+              </a:rPr>
+              <a:t>acmp.ru/index.asp?main=tasks</a:t>
             </a:r>
             <a:endParaRPr lang="en-US" dirty="0" smtClean="0">
               <a:solidFill>
@@ -5247,6 +5275,52 @@
             </a:endParaRPr>
           </a:p>
           <a:p>
+            <a:endParaRPr lang="en-US" dirty="0">
+              <a:solidFill>
+                <a:schemeClr val="bg1"/>
+              </a:solidFill>
+            </a:endParaRPr>
+          </a:p>
+          <a:p>
+            <a:r>
+              <a:rPr lang="ru-RU" dirty="0" smtClean="0">
+                <a:solidFill>
+                  <a:schemeClr val="bg1"/>
+                </a:solidFill>
+              </a:rPr>
+              <a:t>Математические </a:t>
+            </a:r>
+            <a:r>
+              <a:rPr lang="ru-RU" dirty="0" smtClean="0">
+                <a:solidFill>
+                  <a:schemeClr val="bg1"/>
+                </a:solidFill>
+              </a:rPr>
+              <a:t>задачи</a:t>
+            </a:r>
+            <a:br>
+              <a:rPr lang="ru-RU" dirty="0" smtClean="0">
+                <a:solidFill>
+                  <a:schemeClr val="bg1"/>
+                </a:solidFill>
+              </a:rPr>
+            </a:br>
+            <a:r>
+              <a:rPr lang="en-US" dirty="0" smtClean="0">
+                <a:solidFill>
+                  <a:schemeClr val="bg1"/>
+                </a:solidFill>
+                <a:hlinkClick r:id="rId3"/>
+              </a:rPr>
+              <a:t>http://projecteuler.net</a:t>
+            </a:r>
+            <a:endParaRPr lang="en-US" dirty="0" smtClean="0">
+              <a:solidFill>
+                <a:schemeClr val="bg1"/>
+              </a:solidFill>
+            </a:endParaRPr>
+          </a:p>
+          <a:p>
             <a:endParaRPr lang="ru-RU" dirty="0" smtClean="0">
               <a:solidFill>
                 <a:schemeClr val="bg1"/>
@@ -5306,7 +5380,7 @@
                 <a:solidFill>
                   <a:schemeClr val="bg1"/>
                 </a:solidFill>
-                <a:hlinkClick r:id="rId3"/>
+                <a:hlinkClick r:id="rId4"/>
               </a:rPr>
               <a:t>http://www.pex4fun.com</a:t>
             </a:r>
@@ -5352,7 +5426,7 @@
                 <a:solidFill>
                   <a:schemeClr val="bg1"/>
                 </a:solidFill>
-                <a:hlinkClick r:id="rId4"/>
+                <a:hlinkClick r:id="rId5"/>
               </a:rPr>
               <a:t>http://codegolf.stackexchange.com</a:t>
             </a:r>

</xml_diff>

<commit_message>
More links to programming tasks sites
</commit_message>
<xml_diff>
--- a/Presentation/that-is-all-folks.pptx
+++ b/Presentation/that-is-all-folks.pptx
@@ -203,7 +203,7 @@
           <a:p>
             <a:fld id="{B24A7054-7FFB-49F4-A126-5DF6E687FF53}" type="datetimeFigureOut">
               <a:rPr lang="ru-RU" smtClean="0"/>
-              <a:t>13.02.2015</a:t>
+              <a:t>20.10.2015</a:t>
             </a:fld>
             <a:endParaRPr lang="ru-RU"/>
           </a:p>
@@ -1485,7 +1485,7 @@
           <a:p>
             <a:fld id="{8E6E6A2A-E9D3-4A0D-B04A-ABDD367A1E08}" type="datetimeFigureOut">
               <a:rPr lang="ru-RU" smtClean="0"/>
-              <a:t>13.02.2015</a:t>
+              <a:t>20.10.2015</a:t>
             </a:fld>
             <a:endParaRPr lang="ru-RU"/>
           </a:p>
@@ -2930,7 +2930,7 @@
           <a:p>
             <a:fld id="{AC3D3127-B7C4-45E3-9797-C527EC9FDD78}" type="datetimeFigureOut">
               <a:rPr lang="ru-RU" smtClean="0"/>
-              <a:t>13.02.2015</a:t>
+              <a:t>20.10.2015</a:t>
             </a:fld>
             <a:endParaRPr lang="ru-RU"/>
           </a:p>
@@ -3557,7 +3557,7 @@
         </p:spPr>
         <p:txBody>
           <a:bodyPr>
-            <a:normAutofit fontScale="92500" lnSpcReduction="10000"/>
+            <a:normAutofit fontScale="85000" lnSpcReduction="20000"/>
           </a:bodyPr>
           <a:lstStyle/>
           <a:p>
@@ -3628,6 +3628,61 @@
           </a:p>
           <a:p>
             <a:r>
+              <a:rPr lang="en-US" dirty="0" err="1">
+                <a:solidFill>
+                  <a:schemeClr val="bg1"/>
+                </a:solidFill>
+              </a:rPr>
+              <a:t>Timus</a:t>
+            </a:r>
+            <a:r>
+              <a:rPr lang="en-US" dirty="0">
+                <a:solidFill>
+                  <a:schemeClr val="bg1"/>
+                </a:solidFill>
+              </a:rPr>
+              <a:t> Online Judge</a:t>
+            </a:r>
+            <a:br>
+              <a:rPr lang="en-US" dirty="0">
+                <a:solidFill>
+                  <a:schemeClr val="bg1"/>
+                </a:solidFill>
+              </a:rPr>
+            </a:br>
+            <a:r>
+              <a:rPr lang="en-US" dirty="0">
+                <a:solidFill>
+                  <a:schemeClr val="bg1"/>
+                </a:solidFill>
+                <a:hlinkClick r:id="rId3"/>
+              </a:rPr>
+              <a:t>http://acm.timus.ru/?</a:t>
+            </a:r>
+            <a:r>
+              <a:rPr lang="en-US" dirty="0" smtClean="0">
+                <a:solidFill>
+                  <a:schemeClr val="bg1"/>
+                </a:solidFill>
+                <a:hlinkClick r:id="rId3"/>
+              </a:rPr>
+              <a:t>locale=ru</a:t>
+            </a:r>
+            <a:endParaRPr lang="en-US" dirty="0">
+              <a:solidFill>
+                <a:schemeClr val="bg1"/>
+              </a:solidFill>
+            </a:endParaRPr>
+          </a:p>
+          <a:p>
+            <a:endParaRPr lang="en-US" dirty="0">
+              <a:solidFill>
+                <a:schemeClr val="bg1"/>
+              </a:solidFill>
+            </a:endParaRPr>
+          </a:p>
+          <a:p>
+            <a:r>
               <a:rPr lang="ru-RU" dirty="0" smtClean="0">
                 <a:solidFill>
                   <a:schemeClr val="bg1"/>
@@ -3647,7 +3702,7 @@
                 <a:solidFill>
                   <a:schemeClr val="bg1"/>
                 </a:solidFill>
-                <a:hlinkClick r:id="rId3"/>
+                <a:hlinkClick r:id="rId4"/>
               </a:rPr>
               <a:t>http://projecteuler.net</a:t>
             </a:r>
@@ -3717,7 +3772,7 @@
                 <a:solidFill>
                   <a:schemeClr val="bg1"/>
                 </a:solidFill>
-                <a:hlinkClick r:id="rId4"/>
+                <a:hlinkClick r:id="rId5"/>
               </a:rPr>
               <a:t>http://www.pex4fun.com</a:t>
             </a:r>
@@ -3763,7 +3818,7 @@
                 <a:solidFill>
                   <a:schemeClr val="bg1"/>
                 </a:solidFill>
-                <a:hlinkClick r:id="rId5"/>
+                <a:hlinkClick r:id="rId6"/>
               </a:rPr>
               <a:t>http://codegolf.stackexchange.com</a:t>
             </a:r>

</xml_diff>